<commit_message>
Ch 3 figure work
</commit_message>
<xml_diff>
--- a/ch3_nascent.figures/ch3_nascent.figures.pptx
+++ b/ch3_nascent.figures/ch3_nascent.figures.pptx
@@ -5,8 +5,11 @@
     <p:sldMasterId id="2147483648" r:id="rId1"/>
   </p:sldMasterIdLst>
   <p:sldIdLst>
-    <p:sldId id="256" r:id="rId2"/>
-    <p:sldId id="257" r:id="rId3"/>
+    <p:sldId id="258" r:id="rId2"/>
+    <p:sldId id="259" r:id="rId3"/>
+    <p:sldId id="260" r:id="rId4"/>
+    <p:sldId id="256" r:id="rId5"/>
+    <p:sldId id="257" r:id="rId6"/>
   </p:sldIdLst>
   <p:sldSz cx="6858000" cy="9144000" type="letter"/>
   <p:notesSz cx="6858000" cy="9144000"/>
@@ -105,6 +108,11 @@
       </a:defRPr>
     </a:lvl9pPr>
   </p:defaultTextStyle>
+  <p:extLst>
+    <p:ext uri="{EFAFB233-063F-42B5-8137-9DF3F51BA10A}">
+      <p15:sldGuideLst xmlns:p15="http://schemas.microsoft.com/office/powerpoint/2012/main"/>
+    </p:ext>
+  </p:extLst>
 </p:presentation>
 </file>
 
@@ -239,7 +247,7 @@
           <a:p>
             <a:fld id="{8516BED5-9C33-ED42-9E88-68F126CB796E}" type="datetimeFigureOut">
               <a:rPr lang="en-US" smtClean="0"/>
-              <a:t>9/15/15</a:t>
+              <a:t>11/8/15</a:t>
             </a:fld>
             <a:endParaRPr lang="en-US"/>
           </a:p>
@@ -409,7 +417,7 @@
           <a:p>
             <a:fld id="{8516BED5-9C33-ED42-9E88-68F126CB796E}" type="datetimeFigureOut">
               <a:rPr lang="en-US" smtClean="0"/>
-              <a:t>9/15/15</a:t>
+              <a:t>11/8/15</a:t>
             </a:fld>
             <a:endParaRPr lang="en-US"/>
           </a:p>
@@ -589,7 +597,7 @@
           <a:p>
             <a:fld id="{8516BED5-9C33-ED42-9E88-68F126CB796E}" type="datetimeFigureOut">
               <a:rPr lang="en-US" smtClean="0"/>
-              <a:t>9/15/15</a:t>
+              <a:t>11/8/15</a:t>
             </a:fld>
             <a:endParaRPr lang="en-US"/>
           </a:p>
@@ -759,7 +767,7 @@
           <a:p>
             <a:fld id="{8516BED5-9C33-ED42-9E88-68F126CB796E}" type="datetimeFigureOut">
               <a:rPr lang="en-US" smtClean="0"/>
-              <a:t>9/15/15</a:t>
+              <a:t>11/8/15</a:t>
             </a:fld>
             <a:endParaRPr lang="en-US"/>
           </a:p>
@@ -1005,7 +1013,7 @@
           <a:p>
             <a:fld id="{8516BED5-9C33-ED42-9E88-68F126CB796E}" type="datetimeFigureOut">
               <a:rPr lang="en-US" smtClean="0"/>
-              <a:t>9/15/15</a:t>
+              <a:t>11/8/15</a:t>
             </a:fld>
             <a:endParaRPr lang="en-US"/>
           </a:p>
@@ -1237,7 +1245,7 @@
           <a:p>
             <a:fld id="{8516BED5-9C33-ED42-9E88-68F126CB796E}" type="datetimeFigureOut">
               <a:rPr lang="en-US" smtClean="0"/>
-              <a:t>9/15/15</a:t>
+              <a:t>11/8/15</a:t>
             </a:fld>
             <a:endParaRPr lang="en-US"/>
           </a:p>
@@ -1604,7 +1612,7 @@
           <a:p>
             <a:fld id="{8516BED5-9C33-ED42-9E88-68F126CB796E}" type="datetimeFigureOut">
               <a:rPr lang="en-US" smtClean="0"/>
-              <a:t>9/15/15</a:t>
+              <a:t>11/8/15</a:t>
             </a:fld>
             <a:endParaRPr lang="en-US"/>
           </a:p>
@@ -1722,7 +1730,7 @@
           <a:p>
             <a:fld id="{8516BED5-9C33-ED42-9E88-68F126CB796E}" type="datetimeFigureOut">
               <a:rPr lang="en-US" smtClean="0"/>
-              <a:t>9/15/15</a:t>
+              <a:t>11/8/15</a:t>
             </a:fld>
             <a:endParaRPr lang="en-US"/>
           </a:p>
@@ -1817,7 +1825,7 @@
           <a:p>
             <a:fld id="{8516BED5-9C33-ED42-9E88-68F126CB796E}" type="datetimeFigureOut">
               <a:rPr lang="en-US" smtClean="0"/>
-              <a:t>9/15/15</a:t>
+              <a:t>11/8/15</a:t>
             </a:fld>
             <a:endParaRPr lang="en-US"/>
           </a:p>
@@ -2094,7 +2102,7 @@
           <a:p>
             <a:fld id="{8516BED5-9C33-ED42-9E88-68F126CB796E}" type="datetimeFigureOut">
               <a:rPr lang="en-US" smtClean="0"/>
-              <a:t>9/15/15</a:t>
+              <a:t>11/8/15</a:t>
             </a:fld>
             <a:endParaRPr lang="en-US"/>
           </a:p>
@@ -2347,7 +2355,7 @@
           <a:p>
             <a:fld id="{8516BED5-9C33-ED42-9E88-68F126CB796E}" type="datetimeFigureOut">
               <a:rPr lang="en-US" smtClean="0"/>
-              <a:t>9/15/15</a:t>
+              <a:t>11/8/15</a:t>
             </a:fld>
             <a:endParaRPr lang="en-US"/>
           </a:p>
@@ -2560,7 +2568,7 @@
           <a:p>
             <a:fld id="{8516BED5-9C33-ED42-9E88-68F126CB796E}" type="datetimeFigureOut">
               <a:rPr lang="en-US" smtClean="0"/>
-              <a:t>9/15/15</a:t>
+              <a:t>11/8/15</a:t>
             </a:fld>
             <a:endParaRPr lang="en-US"/>
           </a:p>
@@ -2967,7 +2975,7 @@
       </p:grpSpPr>
       <p:pic>
         <p:nvPicPr>
-          <p:cNvPr id="4" name="Picture 3"/>
+          <p:cNvPr id="2" name="Picture 1" descr="Screen Shot 2014-03-19 at 12.50.22 PM.png"/>
           <p:cNvPicPr>
             <a:picLocks noChangeAspect="1"/>
           </p:cNvPicPr>
@@ -2987,24 +2995,53 @@
         </p:blipFill>
         <p:spPr>
           <a:xfrm>
-            <a:off x="0" y="2578100"/>
-            <a:ext cx="6858000" cy="3967045"/>
+            <a:off x="2196589" y="576775"/>
+            <a:ext cx="2352397" cy="3377985"/>
           </a:xfrm>
           <a:prstGeom prst="rect">
             <a:avLst/>
           </a:prstGeom>
         </p:spPr>
       </p:pic>
-      <p:sp>
-        <p:nvSpPr>
-          <p:cNvPr id="5" name="TextBox 4"/>
+      <p:pic>
+        <p:nvPicPr>
+          <p:cNvPr id="3" name="Picture 2" descr="Screen Shot 2014-03-19 at 6.30.49 PM.png"/>
+          <p:cNvPicPr>
+            <a:picLocks noChangeAspect="1"/>
+          </p:cNvPicPr>
+          <p:nvPr/>
+        </p:nvPicPr>
+        <p:blipFill rotWithShape="1">
+          <a:blip r:embed="rId3">
+            <a:extLst>
+              <a:ext uri="{28A0092B-C50C-407E-A947-70E740481C1C}">
+                <a14:useLocalDpi xmlns:a14="http://schemas.microsoft.com/office/drawing/2010/main" val="0"/>
+              </a:ext>
+            </a:extLst>
+          </a:blip>
+          <a:srcRect l="17557" b="12577"/>
+          <a:stretch/>
+        </p:blipFill>
+        <p:spPr>
+          <a:xfrm>
+            <a:off x="2588217" y="3840480"/>
+            <a:ext cx="2566644" cy="3110510"/>
+          </a:xfrm>
+          <a:prstGeom prst="rect">
+            <a:avLst/>
+          </a:prstGeom>
+        </p:spPr>
+      </p:pic>
+      <p:sp>
+        <p:nvSpPr>
+          <p:cNvPr id="4" name="TextBox 3"/>
           <p:cNvSpPr txBox="1"/>
           <p:nvPr/>
         </p:nvSpPr>
         <p:spPr>
           <a:xfrm>
-            <a:off x="0" y="0"/>
-            <a:ext cx="750526" cy="369332"/>
+            <a:off x="2588217" y="6950990"/>
+            <a:ext cx="1056700" cy="923330"/>
           </a:xfrm>
           <a:prstGeom prst="rect">
             <a:avLst/>
@@ -3018,21 +3055,143 @@
           <a:lstStyle/>
           <a:p>
             <a:r>
-              <a:rPr lang="en-US" dirty="0" smtClean="0"/>
-              <a:t>Fig</a:t>
-            </a:r>
-            <a:r>
-              <a:rPr lang="en-US" dirty="0" smtClean="0"/>
-              <a:t>. 3-</a:t>
-            </a:r>
+              <a:rPr lang="en-US" dirty="0" smtClean="0">
+                <a:solidFill>
+                  <a:srgbClr val="FF0000"/>
+                </a:solidFill>
+              </a:rPr>
+              <a:t>α-tubulin</a:t>
+            </a:r>
+          </a:p>
+          <a:p>
+            <a:r>
+              <a:rPr lang="en-US" dirty="0" smtClean="0">
+                <a:solidFill>
+                  <a:srgbClr val="00B050"/>
+                </a:solidFill>
+              </a:rPr>
+              <a:t>α-H3</a:t>
+            </a:r>
+            <a:endParaRPr lang="en-US" dirty="0">
+              <a:solidFill>
+                <a:srgbClr val="00B050"/>
+              </a:solidFill>
+            </a:endParaRPr>
+          </a:p>
+          <a:p>
             <a:endParaRPr lang="en-US" dirty="0"/>
+          </a:p>
+        </p:txBody>
+      </p:sp>
+      <p:sp>
+        <p:nvSpPr>
+          <p:cNvPr id="5" name="TextBox 4"/>
+          <p:cNvSpPr txBox="1"/>
+          <p:nvPr/>
+        </p:nvSpPr>
+        <p:spPr>
+          <a:xfrm>
+            <a:off x="1272998" y="1255362"/>
+            <a:ext cx="317716" cy="369332"/>
+          </a:xfrm>
+          <a:prstGeom prst="rect">
+            <a:avLst/>
+          </a:prstGeom>
+          <a:noFill/>
+        </p:spPr>
+        <p:txBody>
+          <a:bodyPr wrap="none" rtlCol="0">
+            <a:spAutoFit/>
+          </a:bodyPr>
+          <a:lstStyle/>
+          <a:p>
+            <a:r>
+              <a:rPr lang="en-US" smtClean="0"/>
+              <a:t>A</a:t>
+            </a:r>
+            <a:endParaRPr lang="en-US"/>
+          </a:p>
+        </p:txBody>
+      </p:sp>
+      <p:sp>
+        <p:nvSpPr>
+          <p:cNvPr id="6" name="TextBox 5"/>
+          <p:cNvSpPr txBox="1"/>
+          <p:nvPr/>
+        </p:nvSpPr>
+        <p:spPr>
+          <a:xfrm>
+            <a:off x="1301858" y="4763146"/>
+            <a:ext cx="309700" cy="369332"/>
+          </a:xfrm>
+          <a:prstGeom prst="rect">
+            <a:avLst/>
+          </a:prstGeom>
+          <a:noFill/>
+        </p:spPr>
+        <p:txBody>
+          <a:bodyPr wrap="none" rtlCol="0">
+            <a:spAutoFit/>
+          </a:bodyPr>
+          <a:lstStyle/>
+          <a:p>
+            <a:r>
+              <a:rPr lang="en-US" dirty="0"/>
+              <a:t>B</a:t>
+            </a:r>
+          </a:p>
+        </p:txBody>
+      </p:sp>
+      <p:sp>
+        <p:nvSpPr>
+          <p:cNvPr id="7" name="Rectangle 6"/>
+          <p:cNvSpPr/>
+          <p:nvPr/>
+        </p:nvSpPr>
+        <p:spPr>
+          <a:xfrm>
+            <a:off x="2371241" y="1263111"/>
+            <a:ext cx="224725" cy="294467"/>
+          </a:xfrm>
+          <a:prstGeom prst="rect">
+            <a:avLst/>
+          </a:prstGeom>
+          <a:solidFill>
+            <a:schemeClr val="bg1"/>
+          </a:solidFill>
+          <a:ln>
+            <a:noFill/>
+          </a:ln>
+        </p:spPr>
+        <p:style>
+          <a:lnRef idx="2">
+            <a:schemeClr val="accent1">
+              <a:shade val="50000"/>
+            </a:schemeClr>
+          </a:lnRef>
+          <a:fillRef idx="1">
+            <a:schemeClr val="accent1"/>
+          </a:fillRef>
+          <a:effectRef idx="0">
+            <a:schemeClr val="accent1"/>
+          </a:effectRef>
+          <a:fontRef idx="minor">
+            <a:schemeClr val="lt1"/>
+          </a:fontRef>
+        </p:style>
+        <p:txBody>
+          <a:bodyPr rtlCol="0" anchor="ctr"/>
+          <a:lstStyle/>
+          <a:p>
+            <a:pPr algn="ctr"/>
+            <a:endParaRPr lang="en-US"/>
           </a:p>
         </p:txBody>
       </p:sp>
     </p:spTree>
     <p:extLst>
       <p:ext uri="{BB962C8B-B14F-4D97-AF65-F5344CB8AC3E}">
-        <p14:creationId xmlns:p14="http://schemas.microsoft.com/office/powerpoint/2010/main" val="338068355"/>
+        <p14:creationId xmlns:p14="http://schemas.microsoft.com/office/powerpoint/2010/main" val="1556773026"/>
       </p:ext>
     </p:extLst>
   </p:cSld>
@@ -3067,6 +3226,322 @@
           </p:cNvPicPr>
           <p:nvPr/>
         </p:nvPicPr>
+        <p:blipFill>
+          <a:blip r:embed="rId2">
+            <a:extLst>
+              <a:ext uri="{28A0092B-C50C-407E-A947-70E740481C1C}">
+                <a14:useLocalDpi xmlns:a14="http://schemas.microsoft.com/office/drawing/2010/main" val="0"/>
+              </a:ext>
+            </a:extLst>
+          </a:blip>
+          <a:stretch>
+            <a:fillRect/>
+          </a:stretch>
+        </p:blipFill>
+        <p:spPr>
+          <a:xfrm>
+            <a:off x="379828" y="1522828"/>
+            <a:ext cx="6249572" cy="6249572"/>
+          </a:xfrm>
+          <a:prstGeom prst="rect">
+            <a:avLst/>
+          </a:prstGeom>
+        </p:spPr>
+      </p:pic>
+    </p:spTree>
+    <p:extLst>
+      <p:ext uri="{BB962C8B-B14F-4D97-AF65-F5344CB8AC3E}">
+        <p14:creationId xmlns:p14="http://schemas.microsoft.com/office/powerpoint/2010/main" val="614287664"/>
+      </p:ext>
+    </p:extLst>
+  </p:cSld>
+  <p:clrMapOvr>
+    <a:masterClrMapping/>
+  </p:clrMapOvr>
+</p:sld>
+</file>
+
+<file path=ppt/slides/slide3.xml><?xml version="1.0" encoding="utf-8"?>
+<p:sld xmlns:a="http://schemas.openxmlformats.org/drawingml/2006/main" xmlns:r="http://schemas.openxmlformats.org/officeDocument/2006/relationships" xmlns:p="http://schemas.openxmlformats.org/presentationml/2006/main">
+  <p:cSld>
+    <p:spTree>
+      <p:nvGrpSpPr>
+        <p:cNvPr id="1" name=""/>
+        <p:cNvGrpSpPr/>
+        <p:nvPr/>
+      </p:nvGrpSpPr>
+      <p:grpSpPr>
+        <a:xfrm>
+          <a:off x="0" y="0"/>
+          <a:ext cx="0" cy="0"/>
+          <a:chOff x="0" y="0"/>
+          <a:chExt cx="0" cy="0"/>
+        </a:xfrm>
+      </p:grpSpPr>
+      <p:pic>
+        <p:nvPicPr>
+          <p:cNvPr id="3" name="Picture 2"/>
+          <p:cNvPicPr>
+            <a:picLocks noChangeAspect="1"/>
+          </p:cNvPicPr>
+          <p:nvPr/>
+        </p:nvPicPr>
+        <p:blipFill>
+          <a:blip r:embed="rId2">
+            <a:extLst>
+              <a:ext uri="{28A0092B-C50C-407E-A947-70E740481C1C}">
+                <a14:useLocalDpi xmlns:a14="http://schemas.microsoft.com/office/drawing/2010/main" val="0"/>
+              </a:ext>
+            </a:extLst>
+          </a:blip>
+          <a:stretch>
+            <a:fillRect/>
+          </a:stretch>
+        </p:blipFill>
+        <p:spPr>
+          <a:xfrm>
+            <a:off x="993530" y="1026941"/>
+            <a:ext cx="5173393" cy="5173393"/>
+          </a:xfrm>
+          <a:prstGeom prst="rect">
+            <a:avLst/>
+          </a:prstGeom>
+        </p:spPr>
+      </p:pic>
+      <p:sp>
+        <p:nvSpPr>
+          <p:cNvPr id="4" name="TextBox 3"/>
+          <p:cNvSpPr txBox="1"/>
+          <p:nvPr/>
+        </p:nvSpPr>
+        <p:spPr>
+          <a:xfrm>
+            <a:off x="787792" y="5989712"/>
+            <a:ext cx="4881489" cy="646331"/>
+          </a:xfrm>
+          <a:prstGeom prst="rect">
+            <a:avLst/>
+          </a:prstGeom>
+          <a:solidFill>
+            <a:schemeClr val="bg1"/>
+          </a:solidFill>
+        </p:spPr>
+        <p:txBody>
+          <a:bodyPr wrap="square" rtlCol="0">
+            <a:spAutoFit/>
+          </a:bodyPr>
+          <a:lstStyle/>
+          <a:p>
+            <a:pPr algn="ctr"/>
+            <a:r>
+              <a:rPr lang="en-US" dirty="0" smtClean="0"/>
+              <a:t>Poly(A)+ mRNA</a:t>
+            </a:r>
+          </a:p>
+          <a:p>
+            <a:pPr algn="ctr"/>
+            <a:r>
+              <a:rPr lang="en-US" dirty="0" smtClean="0"/>
+              <a:t>Normalized Expression Level (FPKM)</a:t>
+            </a:r>
+            <a:endParaRPr lang="en-US" dirty="0"/>
+          </a:p>
+        </p:txBody>
+      </p:sp>
+      <p:sp>
+        <p:nvSpPr>
+          <p:cNvPr id="5" name="TextBox 4"/>
+          <p:cNvSpPr txBox="1"/>
+          <p:nvPr/>
+        </p:nvSpPr>
+        <p:spPr>
+          <a:xfrm rot="16200000">
+            <a:off x="-1549791" y="3171097"/>
+            <a:ext cx="4881489" cy="646331"/>
+          </a:xfrm>
+          <a:prstGeom prst="rect">
+            <a:avLst/>
+          </a:prstGeom>
+          <a:solidFill>
+            <a:schemeClr val="bg1"/>
+          </a:solidFill>
+        </p:spPr>
+        <p:txBody>
+          <a:bodyPr wrap="square" rtlCol="0">
+            <a:spAutoFit/>
+          </a:bodyPr>
+          <a:lstStyle/>
+          <a:p>
+            <a:pPr algn="ctr"/>
+            <a:r>
+              <a:rPr lang="en-US" smtClean="0"/>
+              <a:t>Nascent RNA</a:t>
+            </a:r>
+            <a:endParaRPr lang="en-US" dirty="0" smtClean="0"/>
+          </a:p>
+          <a:p>
+            <a:pPr algn="ctr"/>
+            <a:r>
+              <a:rPr lang="en-US" dirty="0" smtClean="0"/>
+              <a:t>Normalized Expression Level (FPKM)</a:t>
+            </a:r>
+            <a:endParaRPr lang="en-US" dirty="0"/>
+          </a:p>
+        </p:txBody>
+      </p:sp>
+      <p:sp>
+        <p:nvSpPr>
+          <p:cNvPr id="6" name="TextBox 5"/>
+          <p:cNvSpPr txBox="1"/>
+          <p:nvPr/>
+        </p:nvSpPr>
+        <p:spPr>
+          <a:xfrm>
+            <a:off x="5387924" y="2639259"/>
+            <a:ext cx="1448972" cy="461665"/>
+          </a:xfrm>
+          <a:prstGeom prst="rect">
+            <a:avLst/>
+          </a:prstGeom>
+          <a:solidFill>
+            <a:schemeClr val="bg1"/>
+          </a:solidFill>
+        </p:spPr>
+        <p:txBody>
+          <a:bodyPr wrap="square" rtlCol="0">
+            <a:spAutoFit/>
+          </a:bodyPr>
+          <a:lstStyle/>
+          <a:p>
+            <a:pPr algn="ctr"/>
+            <a:r>
+              <a:rPr lang="en-US" sz="1200" dirty="0" smtClean="0"/>
+              <a:t>Expression Ratio</a:t>
+            </a:r>
+          </a:p>
+          <a:p>
+            <a:pPr algn="ctr"/>
+            <a:r>
+              <a:rPr lang="en-US" sz="1200" dirty="0" smtClean="0"/>
+              <a:t>( </a:t>
+            </a:r>
+            <a:r>
+              <a:rPr lang="en-US" sz="1200" dirty="0" err="1" smtClean="0"/>
+              <a:t>Nascent:poly</a:t>
+            </a:r>
+            <a:r>
+              <a:rPr lang="en-US" sz="1200" dirty="0" smtClean="0"/>
+              <a:t>(A)+ )</a:t>
+            </a:r>
+            <a:endParaRPr lang="en-US" sz="1200" dirty="0"/>
+          </a:p>
+        </p:txBody>
+      </p:sp>
+    </p:spTree>
+    <p:extLst>
+      <p:ext uri="{BB962C8B-B14F-4D97-AF65-F5344CB8AC3E}">
+        <p14:creationId xmlns:p14="http://schemas.microsoft.com/office/powerpoint/2010/main" val="284643566"/>
+      </p:ext>
+    </p:extLst>
+  </p:cSld>
+  <p:clrMapOvr>
+    <a:masterClrMapping/>
+  </p:clrMapOvr>
+  <p:timing>
+    <p:tnLst>
+      <p:par>
+        <p:cTn id="1" dur="indefinite" restart="never" nodeType="tmRoot"/>
+      </p:par>
+    </p:tnLst>
+  </p:timing>
+</p:sld>
+</file>
+
+<file path=ppt/slides/slide4.xml><?xml version="1.0" encoding="utf-8"?>
+<p:sld xmlns:a="http://schemas.openxmlformats.org/drawingml/2006/main" xmlns:r="http://schemas.openxmlformats.org/officeDocument/2006/relationships" xmlns:p="http://schemas.openxmlformats.org/presentationml/2006/main">
+  <p:cSld>
+    <p:spTree>
+      <p:nvGrpSpPr>
+        <p:cNvPr id="1" name=""/>
+        <p:cNvGrpSpPr/>
+        <p:nvPr/>
+      </p:nvGrpSpPr>
+      <p:grpSpPr>
+        <a:xfrm>
+          <a:off x="0" y="0"/>
+          <a:ext cx="0" cy="0"/>
+          <a:chOff x="0" y="0"/>
+          <a:chExt cx="0" cy="0"/>
+        </a:xfrm>
+      </p:grpSpPr>
+      <p:pic>
+        <p:nvPicPr>
+          <p:cNvPr id="4" name="Picture 3"/>
+          <p:cNvPicPr>
+            <a:picLocks noChangeAspect="1"/>
+          </p:cNvPicPr>
+          <p:nvPr/>
+        </p:nvPicPr>
+        <p:blipFill>
+          <a:blip r:embed="rId2">
+            <a:extLst>
+              <a:ext uri="{28A0092B-C50C-407E-A947-70E740481C1C}">
+                <a14:useLocalDpi xmlns:a14="http://schemas.microsoft.com/office/drawing/2010/main" val="0"/>
+              </a:ext>
+            </a:extLst>
+          </a:blip>
+          <a:stretch>
+            <a:fillRect/>
+          </a:stretch>
+        </p:blipFill>
+        <p:spPr>
+          <a:xfrm>
+            <a:off x="0" y="2578100"/>
+            <a:ext cx="6858000" cy="3967045"/>
+          </a:xfrm>
+          <a:prstGeom prst="rect">
+            <a:avLst/>
+          </a:prstGeom>
+        </p:spPr>
+      </p:pic>
+    </p:spTree>
+    <p:extLst>
+      <p:ext uri="{BB962C8B-B14F-4D97-AF65-F5344CB8AC3E}">
+        <p14:creationId xmlns:p14="http://schemas.microsoft.com/office/powerpoint/2010/main" val="338068355"/>
+      </p:ext>
+    </p:extLst>
+  </p:cSld>
+  <p:clrMapOvr>
+    <a:masterClrMapping/>
+  </p:clrMapOvr>
+</p:sld>
+</file>
+
+<file path=ppt/slides/slide5.xml><?xml version="1.0" encoding="utf-8"?>
+<p:sld xmlns:a="http://schemas.openxmlformats.org/drawingml/2006/main" xmlns:r="http://schemas.openxmlformats.org/officeDocument/2006/relationships" xmlns:p="http://schemas.openxmlformats.org/presentationml/2006/main">
+  <p:cSld>
+    <p:spTree>
+      <p:nvGrpSpPr>
+        <p:cNvPr id="1" name=""/>
+        <p:cNvGrpSpPr/>
+        <p:nvPr/>
+      </p:nvGrpSpPr>
+      <p:grpSpPr>
+        <a:xfrm>
+          <a:off x="0" y="0"/>
+          <a:ext cx="0" cy="0"/>
+          <a:chOff x="0" y="0"/>
+          <a:chExt cx="0" cy="0"/>
+        </a:xfrm>
+      </p:grpSpPr>
+      <p:pic>
+        <p:nvPicPr>
+          <p:cNvPr id="2" name="Picture 1"/>
+          <p:cNvPicPr>
+            <a:picLocks noChangeAspect="1"/>
+          </p:cNvPicPr>
+          <p:nvPr/>
+        </p:nvPicPr>
         <p:blipFill rotWithShape="1">
           <a:blip r:embed="rId2">
             <a:extLst>
@@ -3075,53 +3550,19 @@
               </a:ext>
             </a:extLst>
           </a:blip>
-          <a:srcRect b="67001"/>
+          <a:srcRect l="6102" t="6071" r="7006" b="67001"/>
           <a:stretch/>
         </p:blipFill>
         <p:spPr>
           <a:xfrm>
-            <a:off x="0" y="1716300"/>
-            <a:ext cx="6858000" cy="1748729"/>
+            <a:off x="-2228" y="1937288"/>
+            <a:ext cx="6860346" cy="1642820"/>
           </a:xfrm>
           <a:prstGeom prst="rect">
             <a:avLst/>
           </a:prstGeom>
         </p:spPr>
       </p:pic>
-      <p:sp>
-        <p:nvSpPr>
-          <p:cNvPr id="3" name="TextBox 2"/>
-          <p:cNvSpPr txBox="1"/>
-          <p:nvPr/>
-        </p:nvSpPr>
-        <p:spPr>
-          <a:xfrm>
-            <a:off x="0" y="0"/>
-            <a:ext cx="750526" cy="369332"/>
-          </a:xfrm>
-          <a:prstGeom prst="rect">
-            <a:avLst/>
-          </a:prstGeom>
-          <a:noFill/>
-        </p:spPr>
-        <p:txBody>
-          <a:bodyPr wrap="none" rtlCol="0">
-            <a:spAutoFit/>
-          </a:bodyPr>
-          <a:lstStyle/>
-          <a:p>
-            <a:r>
-              <a:rPr lang="en-US" dirty="0" smtClean="0"/>
-              <a:t>Fig</a:t>
-            </a:r>
-            <a:r>
-              <a:rPr lang="en-US" dirty="0" smtClean="0"/>
-              <a:t>. 3-</a:t>
-            </a:r>
-            <a:endParaRPr lang="en-US" dirty="0"/>
-          </a:p>
-        </p:txBody>
-      </p:sp>
     </p:spTree>
     <p:extLst>
       <p:ext uri="{BB962C8B-B14F-4D97-AF65-F5344CB8AC3E}">

</xml_diff>

<commit_message>
Ch 3 figure legends
</commit_message>
<xml_diff>
--- a/ch3_nascent.figures/ch3_nascent.figures.pptx
+++ b/ch3_nascent.figures/ch3_nascent.figures.pptx
@@ -6,10 +6,11 @@
   </p:sldMasterIdLst>
   <p:sldIdLst>
     <p:sldId id="258" r:id="rId2"/>
-    <p:sldId id="259" r:id="rId3"/>
-    <p:sldId id="260" r:id="rId4"/>
-    <p:sldId id="256" r:id="rId5"/>
-    <p:sldId id="257" r:id="rId6"/>
+    <p:sldId id="256" r:id="rId3"/>
+    <p:sldId id="257" r:id="rId4"/>
+    <p:sldId id="259" r:id="rId5"/>
+    <p:sldId id="260" r:id="rId6"/>
+    <p:sldId id="261" r:id="rId7"/>
   </p:sldIdLst>
   <p:sldSz cx="6858000" cy="9144000" type="letter"/>
   <p:notesSz cx="6858000" cy="9144000"/>
@@ -3220,6 +3221,125 @@
       </p:grpSpPr>
       <p:pic>
         <p:nvPicPr>
+          <p:cNvPr id="4" name="Picture 3"/>
+          <p:cNvPicPr>
+            <a:picLocks noChangeAspect="1"/>
+          </p:cNvPicPr>
+          <p:nvPr/>
+        </p:nvPicPr>
+        <p:blipFill>
+          <a:blip r:embed="rId2">
+            <a:extLst>
+              <a:ext uri="{28A0092B-C50C-407E-A947-70E740481C1C}">
+                <a14:useLocalDpi xmlns:a14="http://schemas.microsoft.com/office/drawing/2010/main" val="0"/>
+              </a:ext>
+            </a:extLst>
+          </a:blip>
+          <a:stretch>
+            <a:fillRect/>
+          </a:stretch>
+        </p:blipFill>
+        <p:spPr>
+          <a:xfrm>
+            <a:off x="0" y="2578100"/>
+            <a:ext cx="6858000" cy="3967045"/>
+          </a:xfrm>
+          <a:prstGeom prst="rect">
+            <a:avLst/>
+          </a:prstGeom>
+        </p:spPr>
+      </p:pic>
+    </p:spTree>
+    <p:extLst>
+      <p:ext uri="{BB962C8B-B14F-4D97-AF65-F5344CB8AC3E}">
+        <p14:creationId xmlns:p14="http://schemas.microsoft.com/office/powerpoint/2010/main" val="338068355"/>
+      </p:ext>
+    </p:extLst>
+  </p:cSld>
+  <p:clrMapOvr>
+    <a:masterClrMapping/>
+  </p:clrMapOvr>
+</p:sld>
+</file>
+
+<file path=ppt/slides/slide3.xml><?xml version="1.0" encoding="utf-8"?>
+<p:sld xmlns:a="http://schemas.openxmlformats.org/drawingml/2006/main" xmlns:r="http://schemas.openxmlformats.org/officeDocument/2006/relationships" xmlns:p="http://schemas.openxmlformats.org/presentationml/2006/main">
+  <p:cSld>
+    <p:spTree>
+      <p:nvGrpSpPr>
+        <p:cNvPr id="1" name=""/>
+        <p:cNvGrpSpPr/>
+        <p:nvPr/>
+      </p:nvGrpSpPr>
+      <p:grpSpPr>
+        <a:xfrm>
+          <a:off x="0" y="0"/>
+          <a:ext cx="0" cy="0"/>
+          <a:chOff x="0" y="0"/>
+          <a:chExt cx="0" cy="0"/>
+        </a:xfrm>
+      </p:grpSpPr>
+      <p:pic>
+        <p:nvPicPr>
+          <p:cNvPr id="4" name="Picture 3"/>
+          <p:cNvPicPr>
+            <a:picLocks noChangeAspect="1"/>
+          </p:cNvPicPr>
+          <p:nvPr/>
+        </p:nvPicPr>
+        <p:blipFill rotWithShape="1">
+          <a:blip r:embed="rId2">
+            <a:extLst>
+              <a:ext uri="{28A0092B-C50C-407E-A947-70E740481C1C}">
+                <a14:useLocalDpi xmlns:a14="http://schemas.microsoft.com/office/drawing/2010/main" val="0"/>
+              </a:ext>
+            </a:extLst>
+          </a:blip>
+          <a:srcRect l="6102" t="8120" r="6327" b="63658"/>
+          <a:stretch/>
+        </p:blipFill>
+        <p:spPr>
+          <a:xfrm>
+            <a:off x="13934" y="2247254"/>
+            <a:ext cx="6845748" cy="1704814"/>
+          </a:xfrm>
+          <a:prstGeom prst="rect">
+            <a:avLst/>
+          </a:prstGeom>
+        </p:spPr>
+      </p:pic>
+    </p:spTree>
+    <p:extLst>
+      <p:ext uri="{BB962C8B-B14F-4D97-AF65-F5344CB8AC3E}">
+        <p14:creationId xmlns:p14="http://schemas.microsoft.com/office/powerpoint/2010/main" val="1729497475"/>
+      </p:ext>
+    </p:extLst>
+  </p:cSld>
+  <p:clrMapOvr>
+    <a:masterClrMapping/>
+  </p:clrMapOvr>
+</p:sld>
+</file>
+
+<file path=ppt/slides/slide4.xml><?xml version="1.0" encoding="utf-8"?>
+<p:sld xmlns:a="http://schemas.openxmlformats.org/drawingml/2006/main" xmlns:r="http://schemas.openxmlformats.org/officeDocument/2006/relationships" xmlns:p="http://schemas.openxmlformats.org/presentationml/2006/main">
+  <p:cSld>
+    <p:spTree>
+      <p:nvGrpSpPr>
+        <p:cNvPr id="1" name=""/>
+        <p:cNvGrpSpPr/>
+        <p:nvPr/>
+      </p:nvGrpSpPr>
+      <p:grpSpPr>
+        <a:xfrm>
+          <a:off x="0" y="0"/>
+          <a:ext cx="0" cy="0"/>
+          <a:chOff x="0" y="0"/>
+          <a:chExt cx="0" cy="0"/>
+        </a:xfrm>
+      </p:grpSpPr>
+      <p:pic>
+        <p:nvPicPr>
           <p:cNvPr id="2" name="Picture 1"/>
           <p:cNvPicPr>
             <a:picLocks noChangeAspect="1"/>
@@ -3240,14 +3360,106 @@
         </p:blipFill>
         <p:spPr>
           <a:xfrm>
-            <a:off x="379828" y="1522828"/>
-            <a:ext cx="6249572" cy="6249572"/>
+            <a:off x="792125" y="1860697"/>
+            <a:ext cx="4784651" cy="4784651"/>
           </a:xfrm>
           <a:prstGeom prst="rect">
             <a:avLst/>
           </a:prstGeom>
         </p:spPr>
       </p:pic>
+      <p:sp>
+        <p:nvSpPr>
+          <p:cNvPr id="4" name="TextBox 3"/>
+          <p:cNvSpPr txBox="1"/>
+          <p:nvPr/>
+        </p:nvSpPr>
+        <p:spPr>
+          <a:xfrm>
+            <a:off x="4848446" y="3318911"/>
+            <a:ext cx="835709" cy="1039052"/>
+          </a:xfrm>
+          <a:prstGeom prst="rect">
+            <a:avLst/>
+          </a:prstGeom>
+          <a:solidFill>
+            <a:schemeClr val="bg1"/>
+          </a:solidFill>
+        </p:spPr>
+        <p:txBody>
+          <a:bodyPr wrap="square" rtlCol="0">
+            <a:spAutoFit/>
+          </a:bodyPr>
+          <a:lstStyle/>
+          <a:p>
+            <a:endParaRPr lang="en-US" sz="1400" dirty="0" smtClean="0"/>
+          </a:p>
+        </p:txBody>
+      </p:sp>
+      <p:sp>
+        <p:nvSpPr>
+          <p:cNvPr id="3" name="TextBox 2"/>
+          <p:cNvSpPr txBox="1"/>
+          <p:nvPr/>
+        </p:nvSpPr>
+        <p:spPr>
+          <a:xfrm>
+            <a:off x="4848446" y="3249967"/>
+            <a:ext cx="1406154" cy="1107996"/>
+          </a:xfrm>
+          <a:prstGeom prst="rect">
+            <a:avLst/>
+          </a:prstGeom>
+          <a:noFill/>
+        </p:spPr>
+        <p:txBody>
+          <a:bodyPr wrap="none" rtlCol="0">
+            <a:spAutoFit/>
+          </a:bodyPr>
+          <a:lstStyle/>
+          <a:p>
+            <a:r>
+              <a:rPr lang="en-US" sz="1100" dirty="0" smtClean="0"/>
+              <a:t>poly(A)+ RNA</a:t>
+            </a:r>
+          </a:p>
+          <a:p>
+            <a:r>
+              <a:rPr lang="en-US" sz="1100" i="1" dirty="0" smtClean="0"/>
+              <a:t>gro</a:t>
+            </a:r>
+            <a:r>
+              <a:rPr lang="en-US" sz="1100" i="1" baseline="30000" dirty="0" smtClean="0"/>
+              <a:t>MB36</a:t>
+            </a:r>
+          </a:p>
+          <a:p>
+            <a:r>
+              <a:rPr lang="en-US" sz="1100" dirty="0" err="1" smtClean="0"/>
+              <a:t>GroΔSP</a:t>
+            </a:r>
+            <a:endParaRPr lang="en-US" sz="1100" dirty="0" smtClean="0"/>
+          </a:p>
+          <a:p>
+            <a:r>
+              <a:rPr lang="en-US" sz="1100" dirty="0" smtClean="0"/>
+              <a:t>Nascent RNA</a:t>
+            </a:r>
+          </a:p>
+          <a:p>
+            <a:r>
+              <a:rPr lang="en-US" sz="1100" dirty="0" smtClean="0"/>
+              <a:t>Gro overexpression 1</a:t>
+            </a:r>
+          </a:p>
+          <a:p>
+            <a:r>
+              <a:rPr lang="en-US" sz="1100" dirty="0" smtClean="0"/>
+              <a:t>Gro overexpression 2</a:t>
+            </a:r>
+          </a:p>
+        </p:txBody>
+      </p:sp>
     </p:spTree>
     <p:extLst>
       <p:ext uri="{BB962C8B-B14F-4D97-AF65-F5344CB8AC3E}">
@@ -3261,7 +3473,7 @@
 </p:sld>
 </file>
 
-<file path=ppt/slides/slide3.xml><?xml version="1.0" encoding="utf-8"?>
+<file path=ppt/slides/slide5.xml><?xml version="1.0" encoding="utf-8"?>
 <p:sld xmlns:a="http://schemas.openxmlformats.org/drawingml/2006/main" xmlns:r="http://schemas.openxmlformats.org/officeDocument/2006/relationships" xmlns:p="http://schemas.openxmlformats.org/presentationml/2006/main">
   <p:cSld>
     <p:spTree>
@@ -3334,8 +3546,12 @@
           <a:p>
             <a:pPr algn="ctr"/>
             <a:r>
+              <a:rPr lang="en-US" dirty="0"/>
+              <a:t>p</a:t>
+            </a:r>
+            <a:r>
               <a:rPr lang="en-US" dirty="0" smtClean="0"/>
-              <a:t>Poly(A)+ mRNA</a:t>
+              <a:t>oly(A)+ mRNA</a:t>
             </a:r>
           </a:p>
           <a:p>
@@ -3457,67 +3673,7 @@
 </p:sld>
 </file>
 
-<file path=ppt/slides/slide4.xml><?xml version="1.0" encoding="utf-8"?>
-<p:sld xmlns:a="http://schemas.openxmlformats.org/drawingml/2006/main" xmlns:r="http://schemas.openxmlformats.org/officeDocument/2006/relationships" xmlns:p="http://schemas.openxmlformats.org/presentationml/2006/main">
-  <p:cSld>
-    <p:spTree>
-      <p:nvGrpSpPr>
-        <p:cNvPr id="1" name=""/>
-        <p:cNvGrpSpPr/>
-        <p:nvPr/>
-      </p:nvGrpSpPr>
-      <p:grpSpPr>
-        <a:xfrm>
-          <a:off x="0" y="0"/>
-          <a:ext cx="0" cy="0"/>
-          <a:chOff x="0" y="0"/>
-          <a:chExt cx="0" cy="0"/>
-        </a:xfrm>
-      </p:grpSpPr>
-      <p:pic>
-        <p:nvPicPr>
-          <p:cNvPr id="4" name="Picture 3"/>
-          <p:cNvPicPr>
-            <a:picLocks noChangeAspect="1"/>
-          </p:cNvPicPr>
-          <p:nvPr/>
-        </p:nvPicPr>
-        <p:blipFill>
-          <a:blip r:embed="rId2">
-            <a:extLst>
-              <a:ext uri="{28A0092B-C50C-407E-A947-70E740481C1C}">
-                <a14:useLocalDpi xmlns:a14="http://schemas.microsoft.com/office/drawing/2010/main" val="0"/>
-              </a:ext>
-            </a:extLst>
-          </a:blip>
-          <a:stretch>
-            <a:fillRect/>
-          </a:stretch>
-        </p:blipFill>
-        <p:spPr>
-          <a:xfrm>
-            <a:off x="0" y="2578100"/>
-            <a:ext cx="6858000" cy="3967045"/>
-          </a:xfrm>
-          <a:prstGeom prst="rect">
-            <a:avLst/>
-          </a:prstGeom>
-        </p:spPr>
-      </p:pic>
-    </p:spTree>
-    <p:extLst>
-      <p:ext uri="{BB962C8B-B14F-4D97-AF65-F5344CB8AC3E}">
-        <p14:creationId xmlns:p14="http://schemas.microsoft.com/office/powerpoint/2010/main" val="338068355"/>
-      </p:ext>
-    </p:extLst>
-  </p:cSld>
-  <p:clrMapOvr>
-    <a:masterClrMapping/>
-  </p:clrMapOvr>
-</p:sld>
-</file>
-
-<file path=ppt/slides/slide5.xml><?xml version="1.0" encoding="utf-8"?>
+<file path=ppt/slides/slide6.xml><?xml version="1.0" encoding="utf-8"?>
 <p:sld xmlns:a="http://schemas.openxmlformats.org/drawingml/2006/main" xmlns:r="http://schemas.openxmlformats.org/officeDocument/2006/relationships" xmlns:p="http://schemas.openxmlformats.org/presentationml/2006/main">
   <p:cSld>
     <p:spTree>
@@ -3542,7 +3698,7 @@
           </p:cNvPicPr>
           <p:nvPr/>
         </p:nvPicPr>
-        <p:blipFill rotWithShape="1">
+        <p:blipFill>
           <a:blip r:embed="rId2">
             <a:extLst>
               <a:ext uri="{28A0092B-C50C-407E-A947-70E740481C1C}">
@@ -3550,13 +3706,14 @@
               </a:ext>
             </a:extLst>
           </a:blip>
-          <a:srcRect l="6102" t="6071" r="7006" b="67001"/>
-          <a:stretch/>
+          <a:stretch>
+            <a:fillRect/>
+          </a:stretch>
         </p:blipFill>
         <p:spPr>
           <a:xfrm>
-            <a:off x="-2228" y="1937288"/>
-            <a:ext cx="6860346" cy="1642820"/>
+            <a:off x="0" y="2857500"/>
+            <a:ext cx="6858000" cy="3429000"/>
           </a:xfrm>
           <a:prstGeom prst="rect">
             <a:avLst/>
@@ -3566,7 +3723,7 @@
     </p:spTree>
     <p:extLst>
       <p:ext uri="{BB962C8B-B14F-4D97-AF65-F5344CB8AC3E}">
-        <p14:creationId xmlns:p14="http://schemas.microsoft.com/office/powerpoint/2010/main" val="1729497475"/>
+        <p14:creationId xmlns:p14="http://schemas.microsoft.com/office/powerpoint/2010/main" val="138419633"/>
       </p:ext>
     </p:extLst>
   </p:cSld>

</xml_diff>

<commit_message>
Ch 1 and 3 submission
</commit_message>
<xml_diff>
--- a/ch3_nascent.figures/ch3_nascent.figures.pptx
+++ b/ch3_nascent.figures/ch3_nascent.figures.pptx
@@ -3690,35 +3690,6 @@
           <a:chExt cx="0" cy="0"/>
         </a:xfrm>
       </p:grpSpPr>
-      <p:pic>
-        <p:nvPicPr>
-          <p:cNvPr id="2" name="Picture 1"/>
-          <p:cNvPicPr>
-            <a:picLocks noChangeAspect="1"/>
-          </p:cNvPicPr>
-          <p:nvPr/>
-        </p:nvPicPr>
-        <p:blipFill rotWithShape="1">
-          <a:blip r:embed="rId2">
-            <a:extLst>
-              <a:ext uri="{28A0092B-C50C-407E-A947-70E740481C1C}">
-                <a14:useLocalDpi xmlns:a14="http://schemas.microsoft.com/office/drawing/2010/main" val="0"/>
-              </a:ext>
-            </a:extLst>
-          </a:blip>
-          <a:srcRect r="7579"/>
-          <a:stretch/>
-        </p:blipFill>
-        <p:spPr>
-          <a:xfrm>
-            <a:off x="0" y="2857500"/>
-            <a:ext cx="6338277" cy="3429000"/>
-          </a:xfrm>
-          <a:prstGeom prst="rect">
-            <a:avLst/>
-          </a:prstGeom>
-        </p:spPr>
-      </p:pic>
       <p:sp>
         <p:nvSpPr>
           <p:cNvPr id="3" name="Rectangle 2"/>
@@ -3865,7 +3836,7 @@
         </p:nvSpPr>
         <p:spPr>
           <a:xfrm>
-            <a:off x="3028421" y="7309360"/>
+            <a:off x="3778695" y="7309360"/>
             <a:ext cx="1215333" cy="461665"/>
           </a:xfrm>
           <a:prstGeom prst="rect">
@@ -3916,7 +3887,7 @@
         </p:blipFill>
         <p:spPr>
           <a:xfrm>
-            <a:off x="4243754" y="7127628"/>
+            <a:off x="4994028" y="7127628"/>
             <a:ext cx="422031" cy="825131"/>
           </a:xfrm>
           <a:prstGeom prst="rect">
@@ -3932,7 +3903,7 @@
         </p:nvSpPr>
         <p:spPr>
           <a:xfrm>
-            <a:off x="4610393" y="7127628"/>
+            <a:off x="5360667" y="7127628"/>
             <a:ext cx="848694" cy="646331"/>
           </a:xfrm>
           <a:prstGeom prst="rect">
@@ -3967,7 +3938,7 @@
         </p:nvSpPr>
         <p:spPr>
           <a:xfrm>
-            <a:off x="4610393" y="7348039"/>
+            <a:off x="5360667" y="7348039"/>
             <a:ext cx="1545744" cy="646331"/>
           </a:xfrm>
           <a:prstGeom prst="rect">
@@ -4002,7 +3973,7 @@
         </p:nvSpPr>
         <p:spPr>
           <a:xfrm>
-            <a:off x="4610393" y="7611983"/>
+            <a:off x="5360667" y="7611983"/>
             <a:ext cx="1492845" cy="646331"/>
           </a:xfrm>
           <a:prstGeom prst="rect">
@@ -4058,6 +4029,363 @@
             <a:r>
               <a:rPr lang="en-US" sz="1200" dirty="0" smtClean="0"/>
               <a:t> position (5’ to 3’)</a:t>
+            </a:r>
+            <a:endParaRPr lang="en-US" sz="1200" dirty="0"/>
+          </a:p>
+        </p:txBody>
+      </p:sp>
+      <p:pic>
+        <p:nvPicPr>
+          <p:cNvPr id="12" name="Picture 11"/>
+          <p:cNvPicPr>
+            <a:picLocks noChangeAspect="1"/>
+          </p:cNvPicPr>
+          <p:nvPr/>
+        </p:nvPicPr>
+        <p:blipFill rotWithShape="1">
+          <a:blip r:embed="rId3">
+            <a:extLst>
+              <a:ext uri="{28A0092B-C50C-407E-A947-70E740481C1C}">
+                <a14:useLocalDpi xmlns:a14="http://schemas.microsoft.com/office/drawing/2010/main" val="0"/>
+              </a:ext>
+            </a:extLst>
+          </a:blip>
+          <a:srcRect r="9630"/>
+          <a:stretch/>
+        </p:blipFill>
+        <p:spPr>
+          <a:xfrm>
+            <a:off x="0" y="1641231"/>
+            <a:ext cx="6845022" cy="5339959"/>
+          </a:xfrm>
+          <a:prstGeom prst="rect">
+            <a:avLst/>
+          </a:prstGeom>
+        </p:spPr>
+      </p:pic>
+      <p:sp>
+        <p:nvSpPr>
+          <p:cNvPr id="15" name="Rectangle 14"/>
+          <p:cNvSpPr/>
+          <p:nvPr/>
+        </p:nvSpPr>
+        <p:spPr>
+          <a:xfrm>
+            <a:off x="3422511" y="1813169"/>
+            <a:ext cx="562708" cy="84944"/>
+          </a:xfrm>
+          <a:prstGeom prst="rect">
+            <a:avLst/>
+          </a:prstGeom>
+          <a:solidFill>
+            <a:srgbClr val="CDCDCD"/>
+          </a:solidFill>
+          <a:ln>
+            <a:noFill/>
+          </a:ln>
+        </p:spPr>
+        <p:style>
+          <a:lnRef idx="2">
+            <a:schemeClr val="accent1">
+              <a:shade val="50000"/>
+            </a:schemeClr>
+          </a:lnRef>
+          <a:fillRef idx="1">
+            <a:schemeClr val="accent1"/>
+          </a:fillRef>
+          <a:effectRef idx="0">
+            <a:schemeClr val="accent1"/>
+          </a:effectRef>
+          <a:fontRef idx="minor">
+            <a:schemeClr val="lt1"/>
+          </a:fontRef>
+        </p:style>
+        <p:txBody>
+          <a:bodyPr rtlCol="0" anchor="ctr"/>
+          <a:lstStyle/>
+          <a:p>
+            <a:pPr algn="ctr"/>
+            <a:endParaRPr lang="en-US"/>
+          </a:p>
+        </p:txBody>
+      </p:sp>
+      <p:sp>
+        <p:nvSpPr>
+          <p:cNvPr id="16" name="Rectangle 15"/>
+          <p:cNvSpPr/>
+          <p:nvPr/>
+        </p:nvSpPr>
+        <p:spPr>
+          <a:xfrm>
+            <a:off x="3270111" y="3469784"/>
+            <a:ext cx="562708" cy="84944"/>
+          </a:xfrm>
+          <a:prstGeom prst="rect">
+            <a:avLst/>
+          </a:prstGeom>
+          <a:solidFill>
+            <a:srgbClr val="CDCDCD"/>
+          </a:solidFill>
+          <a:ln>
+            <a:noFill/>
+          </a:ln>
+        </p:spPr>
+        <p:style>
+          <a:lnRef idx="2">
+            <a:schemeClr val="accent1">
+              <a:shade val="50000"/>
+            </a:schemeClr>
+          </a:lnRef>
+          <a:fillRef idx="1">
+            <a:schemeClr val="accent1"/>
+          </a:fillRef>
+          <a:effectRef idx="0">
+            <a:schemeClr val="accent1"/>
+          </a:effectRef>
+          <a:fontRef idx="minor">
+            <a:schemeClr val="lt1"/>
+          </a:fontRef>
+        </p:style>
+        <p:txBody>
+          <a:bodyPr rtlCol="0" anchor="ctr"/>
+          <a:lstStyle/>
+          <a:p>
+            <a:pPr algn="ctr"/>
+            <a:endParaRPr lang="en-US"/>
+          </a:p>
+        </p:txBody>
+      </p:sp>
+      <p:sp>
+        <p:nvSpPr>
+          <p:cNvPr id="17" name="Rectangle 16"/>
+          <p:cNvSpPr/>
+          <p:nvPr/>
+        </p:nvSpPr>
+        <p:spPr>
+          <a:xfrm>
+            <a:off x="3265576" y="5091816"/>
+            <a:ext cx="562708" cy="84944"/>
+          </a:xfrm>
+          <a:prstGeom prst="rect">
+            <a:avLst/>
+          </a:prstGeom>
+          <a:solidFill>
+            <a:srgbClr val="CDCDCD"/>
+          </a:solidFill>
+          <a:ln>
+            <a:noFill/>
+          </a:ln>
+        </p:spPr>
+        <p:style>
+          <a:lnRef idx="2">
+            <a:schemeClr val="accent1">
+              <a:shade val="50000"/>
+            </a:schemeClr>
+          </a:lnRef>
+          <a:fillRef idx="1">
+            <a:schemeClr val="accent1"/>
+          </a:fillRef>
+          <a:effectRef idx="0">
+            <a:schemeClr val="accent1"/>
+          </a:effectRef>
+          <a:fontRef idx="minor">
+            <a:schemeClr val="lt1"/>
+          </a:fontRef>
+        </p:style>
+        <p:txBody>
+          <a:bodyPr rtlCol="0" anchor="ctr"/>
+          <a:lstStyle/>
+          <a:p>
+            <a:pPr algn="ctr"/>
+            <a:endParaRPr lang="en-US"/>
+          </a:p>
+        </p:txBody>
+      </p:sp>
+      <p:sp>
+        <p:nvSpPr>
+          <p:cNvPr id="13" name="TextBox 12"/>
+          <p:cNvSpPr txBox="1"/>
+          <p:nvPr/>
+        </p:nvSpPr>
+        <p:spPr>
+          <a:xfrm>
+            <a:off x="3002674" y="1724715"/>
+            <a:ext cx="1455432" cy="246221"/>
+          </a:xfrm>
+          <a:prstGeom prst="rect">
+            <a:avLst/>
+          </a:prstGeom>
+          <a:noFill/>
+        </p:spPr>
+        <p:txBody>
+          <a:bodyPr wrap="square" rtlCol="0">
+            <a:spAutoFit/>
+          </a:bodyPr>
+          <a:lstStyle/>
+          <a:p>
+            <a:r>
+              <a:rPr lang="en-US" sz="1000" dirty="0" smtClean="0"/>
+              <a:t>1.5 – 4 </a:t>
+            </a:r>
+            <a:r>
+              <a:rPr lang="en-US" sz="1000" dirty="0" err="1" smtClean="0"/>
+              <a:t>hr</a:t>
+            </a:r>
+            <a:r>
+              <a:rPr lang="en-US" sz="1000" dirty="0" smtClean="0"/>
+              <a:t> embryos</a:t>
+            </a:r>
+            <a:endParaRPr lang="en-US" sz="1000" dirty="0"/>
+          </a:p>
+        </p:txBody>
+      </p:sp>
+      <p:sp>
+        <p:nvSpPr>
+          <p:cNvPr id="18" name="TextBox 17"/>
+          <p:cNvSpPr txBox="1"/>
+          <p:nvPr/>
+        </p:nvSpPr>
+        <p:spPr>
+          <a:xfrm>
+            <a:off x="3002674" y="3366247"/>
+            <a:ext cx="1455432" cy="246221"/>
+          </a:xfrm>
+          <a:prstGeom prst="rect">
+            <a:avLst/>
+          </a:prstGeom>
+          <a:noFill/>
+        </p:spPr>
+        <p:txBody>
+          <a:bodyPr wrap="square" rtlCol="0">
+            <a:spAutoFit/>
+          </a:bodyPr>
+          <a:lstStyle/>
+          <a:p>
+            <a:r>
+              <a:rPr lang="en-US" sz="1000" dirty="0" smtClean="0"/>
+              <a:t>4 – 6.5 </a:t>
+            </a:r>
+            <a:r>
+              <a:rPr lang="en-US" sz="1000" dirty="0" err="1" smtClean="0"/>
+              <a:t>hr</a:t>
+            </a:r>
+            <a:r>
+              <a:rPr lang="en-US" sz="1000" dirty="0" smtClean="0"/>
+              <a:t> embryos</a:t>
+            </a:r>
+            <a:endParaRPr lang="en-US" sz="1000" dirty="0"/>
+          </a:p>
+        </p:txBody>
+      </p:sp>
+      <p:sp>
+        <p:nvSpPr>
+          <p:cNvPr id="19" name="TextBox 18"/>
+          <p:cNvSpPr txBox="1"/>
+          <p:nvPr/>
+        </p:nvSpPr>
+        <p:spPr>
+          <a:xfrm>
+            <a:off x="2999337" y="4995547"/>
+            <a:ext cx="1455432" cy="246221"/>
+          </a:xfrm>
+          <a:prstGeom prst="rect">
+            <a:avLst/>
+          </a:prstGeom>
+          <a:noFill/>
+        </p:spPr>
+        <p:txBody>
+          <a:bodyPr wrap="square" rtlCol="0">
+            <a:spAutoFit/>
+          </a:bodyPr>
+          <a:lstStyle/>
+          <a:p>
+            <a:r>
+              <a:rPr lang="en-US" sz="1000" dirty="0" smtClean="0"/>
+              <a:t>6.5 – 9 </a:t>
+            </a:r>
+            <a:r>
+              <a:rPr lang="en-US" sz="1000" dirty="0" err="1" smtClean="0"/>
+              <a:t>hr</a:t>
+            </a:r>
+            <a:r>
+              <a:rPr lang="en-US" sz="1000" dirty="0" smtClean="0"/>
+              <a:t> embryos</a:t>
+            </a:r>
+            <a:endParaRPr lang="en-US" sz="1000" dirty="0"/>
+          </a:p>
+        </p:txBody>
+      </p:sp>
+      <p:sp>
+        <p:nvSpPr>
+          <p:cNvPr id="20" name="Rectangle 19"/>
+          <p:cNvSpPr/>
+          <p:nvPr/>
+        </p:nvSpPr>
+        <p:spPr>
+          <a:xfrm>
+            <a:off x="18283" y="4147087"/>
+            <a:ext cx="200548" cy="260790"/>
+          </a:xfrm>
+          <a:prstGeom prst="rect">
+            <a:avLst/>
+          </a:prstGeom>
+          <a:solidFill>
+            <a:schemeClr val="bg1"/>
+          </a:solidFill>
+          <a:ln>
+            <a:noFill/>
+          </a:ln>
+        </p:spPr>
+        <p:style>
+          <a:lnRef idx="2">
+            <a:schemeClr val="accent1">
+              <a:shade val="50000"/>
+            </a:schemeClr>
+          </a:lnRef>
+          <a:fillRef idx="1">
+            <a:schemeClr val="accent1"/>
+          </a:fillRef>
+          <a:effectRef idx="0">
+            <a:schemeClr val="accent1"/>
+          </a:effectRef>
+          <a:fontRef idx="minor">
+            <a:schemeClr val="lt1"/>
+          </a:fontRef>
+        </p:style>
+        <p:txBody>
+          <a:bodyPr rtlCol="0" anchor="ctr"/>
+          <a:lstStyle/>
+          <a:p>
+            <a:pPr algn="ctr"/>
+            <a:endParaRPr lang="en-US"/>
+          </a:p>
+        </p:txBody>
+      </p:sp>
+      <p:sp>
+        <p:nvSpPr>
+          <p:cNvPr id="21" name="TextBox 20"/>
+          <p:cNvSpPr txBox="1"/>
+          <p:nvPr/>
+        </p:nvSpPr>
+        <p:spPr>
+          <a:xfrm rot="16200000">
+            <a:off x="-767502" y="4133747"/>
+            <a:ext cx="1706942" cy="276999"/>
+          </a:xfrm>
+          <a:prstGeom prst="rect">
+            <a:avLst/>
+          </a:prstGeom>
+          <a:noFill/>
+        </p:spPr>
+        <p:txBody>
+          <a:bodyPr wrap="none" rtlCol="0">
+            <a:spAutoFit/>
+          </a:bodyPr>
+          <a:lstStyle/>
+          <a:p>
+            <a:r>
+              <a:rPr lang="en-US" sz="1200" dirty="0" smtClean="0"/>
+              <a:t>Normalized read density</a:t>
             </a:r>
             <a:endParaRPr lang="en-US" sz="1200" dirty="0"/>
           </a:p>

</xml_diff>

<commit_message>
Stage for final reviewed changed
</commit_message>
<xml_diff>
--- a/ch3_nascent.figures/ch3_nascent.figures.pptx
+++ b/ch3_nascent.figures/ch3_nascent.figures.pptx
@@ -249,7 +249,7 @@
           <a:p>
             <a:fld id="{8516BED5-9C33-ED42-9E88-68F126CB796E}" type="datetimeFigureOut">
               <a:rPr lang="en-US" smtClean="0"/>
-              <a:t>11/8/15</a:t>
+              <a:t>11/13/15</a:t>
             </a:fld>
             <a:endParaRPr lang="en-US"/>
           </a:p>
@@ -419,7 +419,7 @@
           <a:p>
             <a:fld id="{8516BED5-9C33-ED42-9E88-68F126CB796E}" type="datetimeFigureOut">
               <a:rPr lang="en-US" smtClean="0"/>
-              <a:t>11/8/15</a:t>
+              <a:t>11/13/15</a:t>
             </a:fld>
             <a:endParaRPr lang="en-US"/>
           </a:p>
@@ -599,7 +599,7 @@
           <a:p>
             <a:fld id="{8516BED5-9C33-ED42-9E88-68F126CB796E}" type="datetimeFigureOut">
               <a:rPr lang="en-US" smtClean="0"/>
-              <a:t>11/8/15</a:t>
+              <a:t>11/13/15</a:t>
             </a:fld>
             <a:endParaRPr lang="en-US"/>
           </a:p>
@@ -769,7 +769,7 @@
           <a:p>
             <a:fld id="{8516BED5-9C33-ED42-9E88-68F126CB796E}" type="datetimeFigureOut">
               <a:rPr lang="en-US" smtClean="0"/>
-              <a:t>11/8/15</a:t>
+              <a:t>11/13/15</a:t>
             </a:fld>
             <a:endParaRPr lang="en-US"/>
           </a:p>
@@ -1015,7 +1015,7 @@
           <a:p>
             <a:fld id="{8516BED5-9C33-ED42-9E88-68F126CB796E}" type="datetimeFigureOut">
               <a:rPr lang="en-US" smtClean="0"/>
-              <a:t>11/8/15</a:t>
+              <a:t>11/13/15</a:t>
             </a:fld>
             <a:endParaRPr lang="en-US"/>
           </a:p>
@@ -1247,7 +1247,7 @@
           <a:p>
             <a:fld id="{8516BED5-9C33-ED42-9E88-68F126CB796E}" type="datetimeFigureOut">
               <a:rPr lang="en-US" smtClean="0"/>
-              <a:t>11/8/15</a:t>
+              <a:t>11/13/15</a:t>
             </a:fld>
             <a:endParaRPr lang="en-US"/>
           </a:p>
@@ -1614,7 +1614,7 @@
           <a:p>
             <a:fld id="{8516BED5-9C33-ED42-9E88-68F126CB796E}" type="datetimeFigureOut">
               <a:rPr lang="en-US" smtClean="0"/>
-              <a:t>11/8/15</a:t>
+              <a:t>11/13/15</a:t>
             </a:fld>
             <a:endParaRPr lang="en-US"/>
           </a:p>
@@ -1732,7 +1732,7 @@
           <a:p>
             <a:fld id="{8516BED5-9C33-ED42-9E88-68F126CB796E}" type="datetimeFigureOut">
               <a:rPr lang="en-US" smtClean="0"/>
-              <a:t>11/8/15</a:t>
+              <a:t>11/13/15</a:t>
             </a:fld>
             <a:endParaRPr lang="en-US"/>
           </a:p>
@@ -1827,7 +1827,7 @@
           <a:p>
             <a:fld id="{8516BED5-9C33-ED42-9E88-68F126CB796E}" type="datetimeFigureOut">
               <a:rPr lang="en-US" smtClean="0"/>
-              <a:t>11/8/15</a:t>
+              <a:t>11/13/15</a:t>
             </a:fld>
             <a:endParaRPr lang="en-US"/>
           </a:p>
@@ -2104,7 +2104,7 @@
           <a:p>
             <a:fld id="{8516BED5-9C33-ED42-9E88-68F126CB796E}" type="datetimeFigureOut">
               <a:rPr lang="en-US" smtClean="0"/>
-              <a:t>11/8/15</a:t>
+              <a:t>11/13/15</a:t>
             </a:fld>
             <a:endParaRPr lang="en-US"/>
           </a:p>
@@ -2357,7 +2357,7 @@
           <a:p>
             <a:fld id="{8516BED5-9C33-ED42-9E88-68F126CB796E}" type="datetimeFigureOut">
               <a:rPr lang="en-US" smtClean="0"/>
-              <a:t>11/8/15</a:t>
+              <a:t>11/13/15</a:t>
             </a:fld>
             <a:endParaRPr lang="en-US"/>
           </a:p>
@@ -2570,7 +2570,7 @@
           <a:p>
             <a:fld id="{8516BED5-9C33-ED42-9E88-68F126CB796E}" type="datetimeFigureOut">
               <a:rPr lang="en-US" smtClean="0"/>
-              <a:t>11/8/15</a:t>
+              <a:t>11/13/15</a:t>
             </a:fld>
             <a:endParaRPr lang="en-US"/>
           </a:p>

</xml_diff>

<commit_message>
Ch 1/2/3 todo work. Figs: GO, network, polII
</commit_message>
<xml_diff>
--- a/ch3_nascent.figures/ch3_nascent.figures.pptx
+++ b/ch3_nascent.figures/ch3_nascent.figures.pptx
@@ -10,8 +10,9 @@
     <p:sldId id="257" r:id="rId4"/>
     <p:sldId id="259" r:id="rId5"/>
     <p:sldId id="260" r:id="rId6"/>
-    <p:sldId id="261" r:id="rId7"/>
-    <p:sldId id="262" r:id="rId8"/>
+    <p:sldId id="263" r:id="rId7"/>
+    <p:sldId id="261" r:id="rId8"/>
+    <p:sldId id="262" r:id="rId9"/>
   </p:sldIdLst>
   <p:sldSz cx="6858000" cy="9144000" type="letter"/>
   <p:notesSz cx="6858000" cy="9144000"/>
@@ -3691,6 +3692,278 @@
           <a:chExt cx="0" cy="0"/>
         </a:xfrm>
       </p:grpSpPr>
+      <p:pic>
+        <p:nvPicPr>
+          <p:cNvPr id="3" name="Picture 2"/>
+          <p:cNvPicPr>
+            <a:picLocks noChangeAspect="1"/>
+          </p:cNvPicPr>
+          <p:nvPr/>
+        </p:nvPicPr>
+        <p:blipFill rotWithShape="1">
+          <a:blip r:embed="rId2">
+            <a:extLst>
+              <a:ext uri="{28A0092B-C50C-407E-A947-70E740481C1C}">
+                <a14:useLocalDpi xmlns:a14="http://schemas.microsoft.com/office/drawing/2010/main" val="0"/>
+              </a:ext>
+            </a:extLst>
+          </a:blip>
+          <a:srcRect l="26128" r="4152"/>
+          <a:stretch/>
+        </p:blipFill>
+        <p:spPr>
+          <a:xfrm>
+            <a:off x="2202249" y="373613"/>
+            <a:ext cx="4499176" cy="4609485"/>
+          </a:xfrm>
+          <a:prstGeom prst="rect">
+            <a:avLst/>
+          </a:prstGeom>
+        </p:spPr>
+      </p:pic>
+      <p:pic>
+        <p:nvPicPr>
+          <p:cNvPr id="4" name="Picture 3"/>
+          <p:cNvPicPr>
+            <a:picLocks noChangeAspect="1"/>
+          </p:cNvPicPr>
+          <p:nvPr/>
+        </p:nvPicPr>
+        <p:blipFill rotWithShape="1">
+          <a:blip r:embed="rId2">
+            <a:extLst>
+              <a:ext uri="{28A0092B-C50C-407E-A947-70E740481C1C}">
+                <a14:useLocalDpi xmlns:a14="http://schemas.microsoft.com/office/drawing/2010/main" val="0"/>
+              </a:ext>
+            </a:extLst>
+          </a:blip>
+          <a:srcRect r="89019"/>
+          <a:stretch/>
+        </p:blipFill>
+        <p:spPr>
+          <a:xfrm>
+            <a:off x="1493589" y="373612"/>
+            <a:ext cx="708660" cy="4609485"/>
+          </a:xfrm>
+          <a:prstGeom prst="rect">
+            <a:avLst/>
+          </a:prstGeom>
+        </p:spPr>
+      </p:pic>
+      <p:pic>
+        <p:nvPicPr>
+          <p:cNvPr id="2" name="Picture 1"/>
+          <p:cNvPicPr>
+            <a:picLocks noChangeAspect="1"/>
+          </p:cNvPicPr>
+          <p:nvPr/>
+        </p:nvPicPr>
+        <p:blipFill>
+          <a:blip r:embed="rId3">
+            <a:extLst>
+              <a:ext uri="{28A0092B-C50C-407E-A947-70E740481C1C}">
+                <a14:useLocalDpi xmlns:a14="http://schemas.microsoft.com/office/drawing/2010/main" val="0"/>
+              </a:ext>
+            </a:extLst>
+          </a:blip>
+          <a:stretch>
+            <a:fillRect/>
+          </a:stretch>
+        </p:blipFill>
+        <p:spPr>
+          <a:xfrm>
+            <a:off x="0" y="4983098"/>
+            <a:ext cx="6858000" cy="3967045"/>
+          </a:xfrm>
+          <a:prstGeom prst="rect">
+            <a:avLst/>
+          </a:prstGeom>
+        </p:spPr>
+      </p:pic>
+      <p:sp>
+        <p:nvSpPr>
+          <p:cNvPr id="6" name="TextBox 5"/>
+          <p:cNvSpPr txBox="1"/>
+          <p:nvPr/>
+        </p:nvSpPr>
+        <p:spPr>
+          <a:xfrm>
+            <a:off x="4825707" y="6363048"/>
+            <a:ext cx="274434" cy="307777"/>
+          </a:xfrm>
+          <a:prstGeom prst="rect">
+            <a:avLst/>
+          </a:prstGeom>
+          <a:noFill/>
+        </p:spPr>
+        <p:txBody>
+          <a:bodyPr wrap="none" rtlCol="0">
+            <a:spAutoFit/>
+          </a:bodyPr>
+          <a:lstStyle/>
+          <a:p>
+            <a:r>
+              <a:rPr lang="en-US" sz="1400" dirty="0" smtClean="0"/>
+              <a:t>*</a:t>
+            </a:r>
+            <a:endParaRPr lang="en-US" sz="1400" dirty="0"/>
+          </a:p>
+        </p:txBody>
+      </p:sp>
+      <p:sp>
+        <p:nvSpPr>
+          <p:cNvPr id="9" name="TextBox 8"/>
+          <p:cNvSpPr txBox="1"/>
+          <p:nvPr/>
+        </p:nvSpPr>
+        <p:spPr>
+          <a:xfrm>
+            <a:off x="2556408" y="7250308"/>
+            <a:ext cx="274434" cy="307777"/>
+          </a:xfrm>
+          <a:prstGeom prst="rect">
+            <a:avLst/>
+          </a:prstGeom>
+          <a:noFill/>
+        </p:spPr>
+        <p:txBody>
+          <a:bodyPr wrap="none" rtlCol="0">
+            <a:spAutoFit/>
+          </a:bodyPr>
+          <a:lstStyle/>
+          <a:p>
+            <a:r>
+              <a:rPr lang="en-US" sz="1400" dirty="0" smtClean="0"/>
+              <a:t>*</a:t>
+            </a:r>
+            <a:endParaRPr lang="en-US" sz="1400" dirty="0"/>
+          </a:p>
+        </p:txBody>
+      </p:sp>
+      <p:sp>
+        <p:nvSpPr>
+          <p:cNvPr id="10" name="TextBox 9"/>
+          <p:cNvSpPr txBox="1"/>
+          <p:nvPr/>
+        </p:nvSpPr>
+        <p:spPr>
+          <a:xfrm>
+            <a:off x="2969767" y="7004198"/>
+            <a:ext cx="274434" cy="307777"/>
+          </a:xfrm>
+          <a:prstGeom prst="rect">
+            <a:avLst/>
+          </a:prstGeom>
+          <a:noFill/>
+        </p:spPr>
+        <p:txBody>
+          <a:bodyPr wrap="none" rtlCol="0">
+            <a:spAutoFit/>
+          </a:bodyPr>
+          <a:lstStyle/>
+          <a:p>
+            <a:r>
+              <a:rPr lang="en-US" sz="1400" dirty="0" smtClean="0"/>
+              <a:t>*</a:t>
+            </a:r>
+            <a:endParaRPr lang="en-US" sz="1400" dirty="0"/>
+          </a:p>
+        </p:txBody>
+      </p:sp>
+      <p:sp>
+        <p:nvSpPr>
+          <p:cNvPr id="11" name="TextBox 10"/>
+          <p:cNvSpPr txBox="1"/>
+          <p:nvPr/>
+        </p:nvSpPr>
+        <p:spPr>
+          <a:xfrm>
+            <a:off x="702556" y="5083305"/>
+            <a:ext cx="274434" cy="307777"/>
+          </a:xfrm>
+          <a:prstGeom prst="rect">
+            <a:avLst/>
+          </a:prstGeom>
+          <a:noFill/>
+        </p:spPr>
+        <p:txBody>
+          <a:bodyPr wrap="none" rtlCol="0">
+            <a:spAutoFit/>
+          </a:bodyPr>
+          <a:lstStyle/>
+          <a:p>
+            <a:r>
+              <a:rPr lang="en-US" sz="1400" dirty="0" smtClean="0"/>
+              <a:t>*</a:t>
+            </a:r>
+            <a:endParaRPr lang="en-US" sz="1400" dirty="0"/>
+          </a:p>
+        </p:txBody>
+      </p:sp>
+      <p:sp>
+        <p:nvSpPr>
+          <p:cNvPr id="12" name="TextBox 11"/>
+          <p:cNvSpPr txBox="1"/>
+          <p:nvPr/>
+        </p:nvSpPr>
+        <p:spPr>
+          <a:xfrm>
+            <a:off x="4533551" y="5083305"/>
+            <a:ext cx="814647" cy="276999"/>
+          </a:xfrm>
+          <a:prstGeom prst="rect">
+            <a:avLst/>
+          </a:prstGeom>
+          <a:noFill/>
+        </p:spPr>
+        <p:txBody>
+          <a:bodyPr wrap="none" rtlCol="0">
+            <a:spAutoFit/>
+          </a:bodyPr>
+          <a:lstStyle/>
+          <a:p>
+            <a:r>
+              <a:rPr lang="en-US" sz="1200" i="1" dirty="0" smtClean="0"/>
+              <a:t>* p &lt; 10</a:t>
+            </a:r>
+            <a:r>
+              <a:rPr lang="en-US" sz="1200" i="1" baseline="30000" dirty="0" smtClean="0"/>
+              <a:t>-10</a:t>
+            </a:r>
+            <a:endParaRPr lang="en-US" sz="1200" i="1" dirty="0"/>
+          </a:p>
+        </p:txBody>
+      </p:sp>
+    </p:spTree>
+    <p:extLst>
+      <p:ext uri="{BB962C8B-B14F-4D97-AF65-F5344CB8AC3E}">
+        <p14:creationId xmlns:p14="http://schemas.microsoft.com/office/powerpoint/2010/main" val="969745275"/>
+      </p:ext>
+    </p:extLst>
+  </p:cSld>
+  <p:clrMapOvr>
+    <a:masterClrMapping/>
+  </p:clrMapOvr>
+</p:sld>
+</file>
+
+<file path=ppt/slides/slide7.xml><?xml version="1.0" encoding="utf-8"?>
+<p:sld xmlns:a="http://schemas.openxmlformats.org/drawingml/2006/main" xmlns:r="http://schemas.openxmlformats.org/officeDocument/2006/relationships" xmlns:p="http://schemas.openxmlformats.org/presentationml/2006/main">
+  <p:cSld>
+    <p:spTree>
+      <p:nvGrpSpPr>
+        <p:cNvPr id="1" name=""/>
+        <p:cNvGrpSpPr/>
+        <p:nvPr/>
+      </p:nvGrpSpPr>
+      <p:grpSpPr>
+        <a:xfrm>
+          <a:off x="0" y="0"/>
+          <a:ext cx="0" cy="0"/>
+          <a:chOff x="0" y="0"/>
+          <a:chExt cx="0" cy="0"/>
+        </a:xfrm>
+      </p:grpSpPr>
       <p:sp>
         <p:nvSpPr>
           <p:cNvPr id="3" name="Rectangle 2"/>
@@ -4405,7 +4678,7 @@
 </p:sld>
 </file>
 
-<file path=ppt/slides/slide7.xml><?xml version="1.0" encoding="utf-8"?>
+<file path=ppt/slides/slide8.xml><?xml version="1.0" encoding="utf-8"?>
 <p:sld xmlns:a="http://schemas.openxmlformats.org/drawingml/2006/main" xmlns:r="http://schemas.openxmlformats.org/officeDocument/2006/relationships" xmlns:p="http://schemas.openxmlformats.org/presentationml/2006/main">
   <p:cSld>
     <p:spTree>

</xml_diff>

<commit_message>
Ch 2/3 new figures
</commit_message>
<xml_diff>
--- a/ch3_nascent.figures/ch3_nascent.figures.pptx
+++ b/ch3_nascent.figures/ch3_nascent.figures.pptx
@@ -10,9 +10,10 @@
     <p:sldId id="257" r:id="rId4"/>
     <p:sldId id="259" r:id="rId5"/>
     <p:sldId id="260" r:id="rId6"/>
-    <p:sldId id="263" r:id="rId7"/>
-    <p:sldId id="261" r:id="rId8"/>
-    <p:sldId id="262" r:id="rId9"/>
+    <p:sldId id="264" r:id="rId7"/>
+    <p:sldId id="263" r:id="rId8"/>
+    <p:sldId id="261" r:id="rId9"/>
+    <p:sldId id="262" r:id="rId10"/>
   </p:sldIdLst>
   <p:sldSz cx="6858000" cy="9144000" type="letter"/>
   <p:notesSz cx="6858000" cy="9144000"/>
@@ -250,7 +251,7 @@
           <a:p>
             <a:fld id="{8516BED5-9C33-ED42-9E88-68F126CB796E}" type="datetimeFigureOut">
               <a:rPr lang="en-US" smtClean="0"/>
-              <a:t>11/13/15</a:t>
+              <a:t>11/15/15</a:t>
             </a:fld>
             <a:endParaRPr lang="en-US"/>
           </a:p>
@@ -420,7 +421,7 @@
           <a:p>
             <a:fld id="{8516BED5-9C33-ED42-9E88-68F126CB796E}" type="datetimeFigureOut">
               <a:rPr lang="en-US" smtClean="0"/>
-              <a:t>11/13/15</a:t>
+              <a:t>11/15/15</a:t>
             </a:fld>
             <a:endParaRPr lang="en-US"/>
           </a:p>
@@ -600,7 +601,7 @@
           <a:p>
             <a:fld id="{8516BED5-9C33-ED42-9E88-68F126CB796E}" type="datetimeFigureOut">
               <a:rPr lang="en-US" smtClean="0"/>
-              <a:t>11/13/15</a:t>
+              <a:t>11/15/15</a:t>
             </a:fld>
             <a:endParaRPr lang="en-US"/>
           </a:p>
@@ -770,7 +771,7 @@
           <a:p>
             <a:fld id="{8516BED5-9C33-ED42-9E88-68F126CB796E}" type="datetimeFigureOut">
               <a:rPr lang="en-US" smtClean="0"/>
-              <a:t>11/13/15</a:t>
+              <a:t>11/15/15</a:t>
             </a:fld>
             <a:endParaRPr lang="en-US"/>
           </a:p>
@@ -1016,7 +1017,7 @@
           <a:p>
             <a:fld id="{8516BED5-9C33-ED42-9E88-68F126CB796E}" type="datetimeFigureOut">
               <a:rPr lang="en-US" smtClean="0"/>
-              <a:t>11/13/15</a:t>
+              <a:t>11/15/15</a:t>
             </a:fld>
             <a:endParaRPr lang="en-US"/>
           </a:p>
@@ -1248,7 +1249,7 @@
           <a:p>
             <a:fld id="{8516BED5-9C33-ED42-9E88-68F126CB796E}" type="datetimeFigureOut">
               <a:rPr lang="en-US" smtClean="0"/>
-              <a:t>11/13/15</a:t>
+              <a:t>11/15/15</a:t>
             </a:fld>
             <a:endParaRPr lang="en-US"/>
           </a:p>
@@ -1615,7 +1616,7 @@
           <a:p>
             <a:fld id="{8516BED5-9C33-ED42-9E88-68F126CB796E}" type="datetimeFigureOut">
               <a:rPr lang="en-US" smtClean="0"/>
-              <a:t>11/13/15</a:t>
+              <a:t>11/15/15</a:t>
             </a:fld>
             <a:endParaRPr lang="en-US"/>
           </a:p>
@@ -1733,7 +1734,7 @@
           <a:p>
             <a:fld id="{8516BED5-9C33-ED42-9E88-68F126CB796E}" type="datetimeFigureOut">
               <a:rPr lang="en-US" smtClean="0"/>
-              <a:t>11/13/15</a:t>
+              <a:t>11/15/15</a:t>
             </a:fld>
             <a:endParaRPr lang="en-US"/>
           </a:p>
@@ -1828,7 +1829,7 @@
           <a:p>
             <a:fld id="{8516BED5-9C33-ED42-9E88-68F126CB796E}" type="datetimeFigureOut">
               <a:rPr lang="en-US" smtClean="0"/>
-              <a:t>11/13/15</a:t>
+              <a:t>11/15/15</a:t>
             </a:fld>
             <a:endParaRPr lang="en-US"/>
           </a:p>
@@ -2105,7 +2106,7 @@
           <a:p>
             <a:fld id="{8516BED5-9C33-ED42-9E88-68F126CB796E}" type="datetimeFigureOut">
               <a:rPr lang="en-US" smtClean="0"/>
-              <a:t>11/13/15</a:t>
+              <a:t>11/15/15</a:t>
             </a:fld>
             <a:endParaRPr lang="en-US"/>
           </a:p>
@@ -2358,7 +2359,7 @@
           <a:p>
             <a:fld id="{8516BED5-9C33-ED42-9E88-68F126CB796E}" type="datetimeFigureOut">
               <a:rPr lang="en-US" smtClean="0"/>
-              <a:t>11/13/15</a:t>
+              <a:t>11/15/15</a:t>
             </a:fld>
             <a:endParaRPr lang="en-US"/>
           </a:p>
@@ -2571,7 +2572,7 @@
           <a:p>
             <a:fld id="{8516BED5-9C33-ED42-9E88-68F126CB796E}" type="datetimeFigureOut">
               <a:rPr lang="en-US" smtClean="0"/>
-              <a:t>11/13/15</a:t>
+              <a:t>11/15/15</a:t>
             </a:fld>
             <a:endParaRPr lang="en-US"/>
           </a:p>
@@ -3694,7 +3695,7 @@
       </p:grpSpPr>
       <p:pic>
         <p:nvPicPr>
-          <p:cNvPr id="3" name="Picture 2"/>
+          <p:cNvPr id="2" name="Picture 1"/>
           <p:cNvPicPr>
             <a:picLocks noChangeAspect="1"/>
           </p:cNvPicPr>
@@ -3708,51 +3709,82 @@
               </a:ext>
             </a:extLst>
           </a:blip>
-          <a:srcRect l="26128" r="4152"/>
+          <a:srcRect l="6992" r="48293" b="81453"/>
           <a:stretch/>
         </p:blipFill>
         <p:spPr>
           <a:xfrm>
-            <a:off x="2202249" y="373613"/>
-            <a:ext cx="4499176" cy="4609485"/>
+            <a:off x="1706135" y="450388"/>
+            <a:ext cx="3066586" cy="1646044"/>
           </a:xfrm>
           <a:prstGeom prst="rect">
             <a:avLst/>
           </a:prstGeom>
         </p:spPr>
       </p:pic>
+      <p:sp>
+        <p:nvSpPr>
+          <p:cNvPr id="4" name="TextBox 3"/>
+          <p:cNvSpPr txBox="1"/>
+          <p:nvPr/>
+        </p:nvSpPr>
+        <p:spPr>
+          <a:xfrm>
+            <a:off x="457200" y="648940"/>
+            <a:ext cx="317716" cy="369332"/>
+          </a:xfrm>
+          <a:prstGeom prst="rect">
+            <a:avLst/>
+          </a:prstGeom>
+          <a:noFill/>
+        </p:spPr>
+        <p:txBody>
+          <a:bodyPr wrap="none" rtlCol="0">
+            <a:spAutoFit/>
+          </a:bodyPr>
+          <a:lstStyle/>
+          <a:p>
+            <a:r>
+              <a:rPr lang="en-US" dirty="0" smtClean="0"/>
+              <a:t>A</a:t>
+            </a:r>
+            <a:endParaRPr lang="en-US" dirty="0"/>
+          </a:p>
+        </p:txBody>
+      </p:sp>
+      <p:sp>
+        <p:nvSpPr>
+          <p:cNvPr id="5" name="TextBox 4"/>
+          <p:cNvSpPr txBox="1"/>
+          <p:nvPr/>
+        </p:nvSpPr>
+        <p:spPr>
+          <a:xfrm>
+            <a:off x="457200" y="3394565"/>
+            <a:ext cx="309700" cy="369332"/>
+          </a:xfrm>
+          <a:prstGeom prst="rect">
+            <a:avLst/>
+          </a:prstGeom>
+          <a:noFill/>
+        </p:spPr>
+        <p:txBody>
+          <a:bodyPr wrap="none" rtlCol="0">
+            <a:spAutoFit/>
+          </a:bodyPr>
+          <a:lstStyle/>
+          <a:p>
+            <a:r>
+              <a:rPr lang="en-US" dirty="0"/>
+              <a:t>B</a:t>
+            </a:r>
+            <a:endParaRPr lang="en-US" dirty="0"/>
+          </a:p>
+        </p:txBody>
+      </p:sp>
       <p:pic>
         <p:nvPicPr>
-          <p:cNvPr id="4" name="Picture 3"/>
-          <p:cNvPicPr>
-            <a:picLocks noChangeAspect="1"/>
-          </p:cNvPicPr>
-          <p:nvPr/>
-        </p:nvPicPr>
-        <p:blipFill rotWithShape="1">
-          <a:blip r:embed="rId2">
-            <a:extLst>
-              <a:ext uri="{28A0092B-C50C-407E-A947-70E740481C1C}">
-                <a14:useLocalDpi xmlns:a14="http://schemas.microsoft.com/office/drawing/2010/main" val="0"/>
-              </a:ext>
-            </a:extLst>
-          </a:blip>
-          <a:srcRect r="89019"/>
-          <a:stretch/>
-        </p:blipFill>
-        <p:spPr>
-          <a:xfrm>
-            <a:off x="1493589" y="373612"/>
-            <a:ext cx="708660" cy="4609485"/>
-          </a:xfrm>
-          <a:prstGeom prst="rect">
-            <a:avLst/>
-          </a:prstGeom>
-        </p:spPr>
-      </p:pic>
-      <p:pic>
-        <p:nvPicPr>
-          <p:cNvPr id="2" name="Picture 1"/>
+          <p:cNvPr id="6" name="Picture 5"/>
           <p:cNvPicPr>
             <a:picLocks noChangeAspect="1"/>
           </p:cNvPicPr>
@@ -3772,172 +3804,18 @@
         </p:blipFill>
         <p:spPr>
           <a:xfrm>
-            <a:off x="0" y="4983098"/>
-            <a:ext cx="6858000" cy="3967045"/>
+            <a:off x="0" y="3394565"/>
+            <a:ext cx="6858000" cy="5299364"/>
           </a:xfrm>
           <a:prstGeom prst="rect">
             <a:avLst/>
           </a:prstGeom>
         </p:spPr>
       </p:pic>
-      <p:sp>
-        <p:nvSpPr>
-          <p:cNvPr id="6" name="TextBox 5"/>
-          <p:cNvSpPr txBox="1"/>
-          <p:nvPr/>
-        </p:nvSpPr>
-        <p:spPr>
-          <a:xfrm>
-            <a:off x="4825707" y="6363048"/>
-            <a:ext cx="274434" cy="307777"/>
-          </a:xfrm>
-          <a:prstGeom prst="rect">
-            <a:avLst/>
-          </a:prstGeom>
-          <a:noFill/>
-        </p:spPr>
-        <p:txBody>
-          <a:bodyPr wrap="none" rtlCol="0">
-            <a:spAutoFit/>
-          </a:bodyPr>
-          <a:lstStyle/>
-          <a:p>
-            <a:r>
-              <a:rPr lang="en-US" sz="1400" dirty="0" smtClean="0"/>
-              <a:t>*</a:t>
-            </a:r>
-            <a:endParaRPr lang="en-US" sz="1400" dirty="0"/>
-          </a:p>
-        </p:txBody>
-      </p:sp>
-      <p:sp>
-        <p:nvSpPr>
-          <p:cNvPr id="9" name="TextBox 8"/>
-          <p:cNvSpPr txBox="1"/>
-          <p:nvPr/>
-        </p:nvSpPr>
-        <p:spPr>
-          <a:xfrm>
-            <a:off x="2556408" y="7250308"/>
-            <a:ext cx="274434" cy="307777"/>
-          </a:xfrm>
-          <a:prstGeom prst="rect">
-            <a:avLst/>
-          </a:prstGeom>
-          <a:noFill/>
-        </p:spPr>
-        <p:txBody>
-          <a:bodyPr wrap="none" rtlCol="0">
-            <a:spAutoFit/>
-          </a:bodyPr>
-          <a:lstStyle/>
-          <a:p>
-            <a:r>
-              <a:rPr lang="en-US" sz="1400" dirty="0" smtClean="0"/>
-              <a:t>*</a:t>
-            </a:r>
-            <a:endParaRPr lang="en-US" sz="1400" dirty="0"/>
-          </a:p>
-        </p:txBody>
-      </p:sp>
-      <p:sp>
-        <p:nvSpPr>
-          <p:cNvPr id="10" name="TextBox 9"/>
-          <p:cNvSpPr txBox="1"/>
-          <p:nvPr/>
-        </p:nvSpPr>
-        <p:spPr>
-          <a:xfrm>
-            <a:off x="2969767" y="7004198"/>
-            <a:ext cx="274434" cy="307777"/>
-          </a:xfrm>
-          <a:prstGeom prst="rect">
-            <a:avLst/>
-          </a:prstGeom>
-          <a:noFill/>
-        </p:spPr>
-        <p:txBody>
-          <a:bodyPr wrap="none" rtlCol="0">
-            <a:spAutoFit/>
-          </a:bodyPr>
-          <a:lstStyle/>
-          <a:p>
-            <a:r>
-              <a:rPr lang="en-US" sz="1400" dirty="0" smtClean="0"/>
-              <a:t>*</a:t>
-            </a:r>
-            <a:endParaRPr lang="en-US" sz="1400" dirty="0"/>
-          </a:p>
-        </p:txBody>
-      </p:sp>
-      <p:sp>
-        <p:nvSpPr>
-          <p:cNvPr id="11" name="TextBox 10"/>
-          <p:cNvSpPr txBox="1"/>
-          <p:nvPr/>
-        </p:nvSpPr>
-        <p:spPr>
-          <a:xfrm>
-            <a:off x="702556" y="5083305"/>
-            <a:ext cx="274434" cy="307777"/>
-          </a:xfrm>
-          <a:prstGeom prst="rect">
-            <a:avLst/>
-          </a:prstGeom>
-          <a:noFill/>
-        </p:spPr>
-        <p:txBody>
-          <a:bodyPr wrap="none" rtlCol="0">
-            <a:spAutoFit/>
-          </a:bodyPr>
-          <a:lstStyle/>
-          <a:p>
-            <a:r>
-              <a:rPr lang="en-US" sz="1400" dirty="0" smtClean="0"/>
-              <a:t>*</a:t>
-            </a:r>
-            <a:endParaRPr lang="en-US" sz="1400" dirty="0"/>
-          </a:p>
-        </p:txBody>
-      </p:sp>
-      <p:sp>
-        <p:nvSpPr>
-          <p:cNvPr id="12" name="TextBox 11"/>
-          <p:cNvSpPr txBox="1"/>
-          <p:nvPr/>
-        </p:nvSpPr>
-        <p:spPr>
-          <a:xfrm>
-            <a:off x="4533551" y="5083305"/>
-            <a:ext cx="814647" cy="276999"/>
-          </a:xfrm>
-          <a:prstGeom prst="rect">
-            <a:avLst/>
-          </a:prstGeom>
-          <a:noFill/>
-        </p:spPr>
-        <p:txBody>
-          <a:bodyPr wrap="none" rtlCol="0">
-            <a:spAutoFit/>
-          </a:bodyPr>
-          <a:lstStyle/>
-          <a:p>
-            <a:r>
-              <a:rPr lang="en-US" sz="1200" i="1" dirty="0" smtClean="0"/>
-              <a:t>* p &lt; 10</a:t>
-            </a:r>
-            <a:r>
-              <a:rPr lang="en-US" sz="1200" i="1" baseline="30000" dirty="0" smtClean="0"/>
-              <a:t>-10</a:t>
-            </a:r>
-            <a:endParaRPr lang="en-US" sz="1200" i="1" dirty="0"/>
-          </a:p>
-        </p:txBody>
-      </p:sp>
     </p:spTree>
     <p:extLst>
       <p:ext uri="{BB962C8B-B14F-4D97-AF65-F5344CB8AC3E}">
-        <p14:creationId xmlns:p14="http://schemas.microsoft.com/office/powerpoint/2010/main" val="969745275"/>
+        <p14:creationId xmlns:p14="http://schemas.microsoft.com/office/powerpoint/2010/main" val="894143216"/>
       </p:ext>
     </p:extLst>
   </p:cSld>
@@ -3964,6 +3842,278 @@
           <a:chExt cx="0" cy="0"/>
         </a:xfrm>
       </p:grpSpPr>
+      <p:pic>
+        <p:nvPicPr>
+          <p:cNvPr id="3" name="Picture 2"/>
+          <p:cNvPicPr>
+            <a:picLocks noChangeAspect="1"/>
+          </p:cNvPicPr>
+          <p:nvPr/>
+        </p:nvPicPr>
+        <p:blipFill rotWithShape="1">
+          <a:blip r:embed="rId2">
+            <a:extLst>
+              <a:ext uri="{28A0092B-C50C-407E-A947-70E740481C1C}">
+                <a14:useLocalDpi xmlns:a14="http://schemas.microsoft.com/office/drawing/2010/main" val="0"/>
+              </a:ext>
+            </a:extLst>
+          </a:blip>
+          <a:srcRect l="26128" r="4152"/>
+          <a:stretch/>
+        </p:blipFill>
+        <p:spPr>
+          <a:xfrm>
+            <a:off x="2202249" y="373613"/>
+            <a:ext cx="4499176" cy="4609485"/>
+          </a:xfrm>
+          <a:prstGeom prst="rect">
+            <a:avLst/>
+          </a:prstGeom>
+        </p:spPr>
+      </p:pic>
+      <p:pic>
+        <p:nvPicPr>
+          <p:cNvPr id="4" name="Picture 3"/>
+          <p:cNvPicPr>
+            <a:picLocks noChangeAspect="1"/>
+          </p:cNvPicPr>
+          <p:nvPr/>
+        </p:nvPicPr>
+        <p:blipFill rotWithShape="1">
+          <a:blip r:embed="rId2">
+            <a:extLst>
+              <a:ext uri="{28A0092B-C50C-407E-A947-70E740481C1C}">
+                <a14:useLocalDpi xmlns:a14="http://schemas.microsoft.com/office/drawing/2010/main" val="0"/>
+              </a:ext>
+            </a:extLst>
+          </a:blip>
+          <a:srcRect r="89019"/>
+          <a:stretch/>
+        </p:blipFill>
+        <p:spPr>
+          <a:xfrm>
+            <a:off x="1493589" y="373612"/>
+            <a:ext cx="708660" cy="4609485"/>
+          </a:xfrm>
+          <a:prstGeom prst="rect">
+            <a:avLst/>
+          </a:prstGeom>
+        </p:spPr>
+      </p:pic>
+      <p:pic>
+        <p:nvPicPr>
+          <p:cNvPr id="2" name="Picture 1"/>
+          <p:cNvPicPr>
+            <a:picLocks noChangeAspect="1"/>
+          </p:cNvPicPr>
+          <p:nvPr/>
+        </p:nvPicPr>
+        <p:blipFill>
+          <a:blip r:embed="rId3">
+            <a:extLst>
+              <a:ext uri="{28A0092B-C50C-407E-A947-70E740481C1C}">
+                <a14:useLocalDpi xmlns:a14="http://schemas.microsoft.com/office/drawing/2010/main" val="0"/>
+              </a:ext>
+            </a:extLst>
+          </a:blip>
+          <a:stretch>
+            <a:fillRect/>
+          </a:stretch>
+        </p:blipFill>
+        <p:spPr>
+          <a:xfrm>
+            <a:off x="0" y="4983098"/>
+            <a:ext cx="6858000" cy="3967045"/>
+          </a:xfrm>
+          <a:prstGeom prst="rect">
+            <a:avLst/>
+          </a:prstGeom>
+        </p:spPr>
+      </p:pic>
+      <p:sp>
+        <p:nvSpPr>
+          <p:cNvPr id="6" name="TextBox 5"/>
+          <p:cNvSpPr txBox="1"/>
+          <p:nvPr/>
+        </p:nvSpPr>
+        <p:spPr>
+          <a:xfrm>
+            <a:off x="4825707" y="6363048"/>
+            <a:ext cx="274434" cy="307777"/>
+          </a:xfrm>
+          <a:prstGeom prst="rect">
+            <a:avLst/>
+          </a:prstGeom>
+          <a:noFill/>
+        </p:spPr>
+        <p:txBody>
+          <a:bodyPr wrap="none" rtlCol="0">
+            <a:spAutoFit/>
+          </a:bodyPr>
+          <a:lstStyle/>
+          <a:p>
+            <a:r>
+              <a:rPr lang="en-US" sz="1400" dirty="0" smtClean="0"/>
+              <a:t>*</a:t>
+            </a:r>
+            <a:endParaRPr lang="en-US" sz="1400" dirty="0"/>
+          </a:p>
+        </p:txBody>
+      </p:sp>
+      <p:sp>
+        <p:nvSpPr>
+          <p:cNvPr id="9" name="TextBox 8"/>
+          <p:cNvSpPr txBox="1"/>
+          <p:nvPr/>
+        </p:nvSpPr>
+        <p:spPr>
+          <a:xfrm>
+            <a:off x="2556408" y="7250308"/>
+            <a:ext cx="274434" cy="307777"/>
+          </a:xfrm>
+          <a:prstGeom prst="rect">
+            <a:avLst/>
+          </a:prstGeom>
+          <a:noFill/>
+        </p:spPr>
+        <p:txBody>
+          <a:bodyPr wrap="none" rtlCol="0">
+            <a:spAutoFit/>
+          </a:bodyPr>
+          <a:lstStyle/>
+          <a:p>
+            <a:r>
+              <a:rPr lang="en-US" sz="1400" dirty="0" smtClean="0"/>
+              <a:t>*</a:t>
+            </a:r>
+            <a:endParaRPr lang="en-US" sz="1400" dirty="0"/>
+          </a:p>
+        </p:txBody>
+      </p:sp>
+      <p:sp>
+        <p:nvSpPr>
+          <p:cNvPr id="10" name="TextBox 9"/>
+          <p:cNvSpPr txBox="1"/>
+          <p:nvPr/>
+        </p:nvSpPr>
+        <p:spPr>
+          <a:xfrm>
+            <a:off x="2969767" y="7004198"/>
+            <a:ext cx="274434" cy="307777"/>
+          </a:xfrm>
+          <a:prstGeom prst="rect">
+            <a:avLst/>
+          </a:prstGeom>
+          <a:noFill/>
+        </p:spPr>
+        <p:txBody>
+          <a:bodyPr wrap="none" rtlCol="0">
+            <a:spAutoFit/>
+          </a:bodyPr>
+          <a:lstStyle/>
+          <a:p>
+            <a:r>
+              <a:rPr lang="en-US" sz="1400" dirty="0" smtClean="0"/>
+              <a:t>*</a:t>
+            </a:r>
+            <a:endParaRPr lang="en-US" sz="1400" dirty="0"/>
+          </a:p>
+        </p:txBody>
+      </p:sp>
+      <p:sp>
+        <p:nvSpPr>
+          <p:cNvPr id="11" name="TextBox 10"/>
+          <p:cNvSpPr txBox="1"/>
+          <p:nvPr/>
+        </p:nvSpPr>
+        <p:spPr>
+          <a:xfrm>
+            <a:off x="702556" y="5083305"/>
+            <a:ext cx="274434" cy="307777"/>
+          </a:xfrm>
+          <a:prstGeom prst="rect">
+            <a:avLst/>
+          </a:prstGeom>
+          <a:noFill/>
+        </p:spPr>
+        <p:txBody>
+          <a:bodyPr wrap="none" rtlCol="0">
+            <a:spAutoFit/>
+          </a:bodyPr>
+          <a:lstStyle/>
+          <a:p>
+            <a:r>
+              <a:rPr lang="en-US" sz="1400" dirty="0" smtClean="0"/>
+              <a:t>*</a:t>
+            </a:r>
+            <a:endParaRPr lang="en-US" sz="1400" dirty="0"/>
+          </a:p>
+        </p:txBody>
+      </p:sp>
+      <p:sp>
+        <p:nvSpPr>
+          <p:cNvPr id="12" name="TextBox 11"/>
+          <p:cNvSpPr txBox="1"/>
+          <p:nvPr/>
+        </p:nvSpPr>
+        <p:spPr>
+          <a:xfrm>
+            <a:off x="4533551" y="5083305"/>
+            <a:ext cx="814647" cy="276999"/>
+          </a:xfrm>
+          <a:prstGeom prst="rect">
+            <a:avLst/>
+          </a:prstGeom>
+          <a:noFill/>
+        </p:spPr>
+        <p:txBody>
+          <a:bodyPr wrap="none" rtlCol="0">
+            <a:spAutoFit/>
+          </a:bodyPr>
+          <a:lstStyle/>
+          <a:p>
+            <a:r>
+              <a:rPr lang="en-US" sz="1200" i="1" dirty="0" smtClean="0"/>
+              <a:t>* p &lt; 10</a:t>
+            </a:r>
+            <a:r>
+              <a:rPr lang="en-US" sz="1200" i="1" baseline="30000" dirty="0" smtClean="0"/>
+              <a:t>-10</a:t>
+            </a:r>
+            <a:endParaRPr lang="en-US" sz="1200" i="1" dirty="0"/>
+          </a:p>
+        </p:txBody>
+      </p:sp>
+    </p:spTree>
+    <p:extLst>
+      <p:ext uri="{BB962C8B-B14F-4D97-AF65-F5344CB8AC3E}">
+        <p14:creationId xmlns:p14="http://schemas.microsoft.com/office/powerpoint/2010/main" val="969745275"/>
+      </p:ext>
+    </p:extLst>
+  </p:cSld>
+  <p:clrMapOvr>
+    <a:masterClrMapping/>
+  </p:clrMapOvr>
+</p:sld>
+</file>
+
+<file path=ppt/slides/slide8.xml><?xml version="1.0" encoding="utf-8"?>
+<p:sld xmlns:a="http://schemas.openxmlformats.org/drawingml/2006/main" xmlns:r="http://schemas.openxmlformats.org/officeDocument/2006/relationships" xmlns:p="http://schemas.openxmlformats.org/presentationml/2006/main">
+  <p:cSld>
+    <p:spTree>
+      <p:nvGrpSpPr>
+        <p:cNvPr id="1" name=""/>
+        <p:cNvGrpSpPr/>
+        <p:nvPr/>
+      </p:nvGrpSpPr>
+      <p:grpSpPr>
+        <a:xfrm>
+          <a:off x="0" y="0"/>
+          <a:ext cx="0" cy="0"/>
+          <a:chOff x="0" y="0"/>
+          <a:chExt cx="0" cy="0"/>
+        </a:xfrm>
+      </p:grpSpPr>
       <p:sp>
         <p:nvSpPr>
           <p:cNvPr id="3" name="Rectangle 2"/>
@@ -4665,6 +4815,186 @@
           </a:p>
         </p:txBody>
       </p:sp>
+      <p:sp>
+        <p:nvSpPr>
+          <p:cNvPr id="2" name="Rectangle 1"/>
+          <p:cNvSpPr/>
+          <p:nvPr/>
+        </p:nvSpPr>
+        <p:spPr>
+          <a:xfrm>
+            <a:off x="247859" y="6662058"/>
+            <a:ext cx="6566598" cy="235263"/>
+          </a:xfrm>
+          <a:prstGeom prst="rect">
+            <a:avLst/>
+          </a:prstGeom>
+          <a:solidFill>
+            <a:schemeClr val="bg1"/>
+          </a:solidFill>
+          <a:ln>
+            <a:noFill/>
+          </a:ln>
+        </p:spPr>
+        <p:style>
+          <a:lnRef idx="2">
+            <a:schemeClr val="accent1">
+              <a:shade val="50000"/>
+            </a:schemeClr>
+          </a:lnRef>
+          <a:fillRef idx="1">
+            <a:schemeClr val="accent1"/>
+          </a:fillRef>
+          <a:effectRef idx="0">
+            <a:schemeClr val="accent1"/>
+          </a:effectRef>
+          <a:fontRef idx="minor">
+            <a:schemeClr val="lt1"/>
+          </a:fontRef>
+        </p:style>
+        <p:txBody>
+          <a:bodyPr rtlCol="0" anchor="ctr"/>
+          <a:lstStyle/>
+          <a:p>
+            <a:pPr algn="ctr"/>
+            <a:endParaRPr lang="en-US" dirty="0"/>
+          </a:p>
+        </p:txBody>
+      </p:sp>
+      <p:sp>
+        <p:nvSpPr>
+          <p:cNvPr id="14" name="TextBox 13"/>
+          <p:cNvSpPr txBox="1"/>
+          <p:nvPr/>
+        </p:nvSpPr>
+        <p:spPr>
+          <a:xfrm>
+            <a:off x="478167" y="6673413"/>
+            <a:ext cx="320922" cy="307777"/>
+          </a:xfrm>
+          <a:prstGeom prst="rect">
+            <a:avLst/>
+          </a:prstGeom>
+          <a:noFill/>
+        </p:spPr>
+        <p:txBody>
+          <a:bodyPr wrap="none" rtlCol="0">
+            <a:spAutoFit/>
+          </a:bodyPr>
+          <a:lstStyle/>
+          <a:p>
+            <a:r>
+              <a:rPr lang="en-US" sz="1400" dirty="0" smtClean="0"/>
+              <a:t>5’</a:t>
+            </a:r>
+            <a:endParaRPr lang="en-US" sz="1400" dirty="0"/>
+          </a:p>
+        </p:txBody>
+      </p:sp>
+      <p:cxnSp>
+        <p:nvCxnSpPr>
+          <p:cNvPr id="23" name="Straight Connector 22"/>
+          <p:cNvCxnSpPr/>
+          <p:nvPr/>
+        </p:nvCxnSpPr>
+        <p:spPr>
+          <a:xfrm>
+            <a:off x="638628" y="6667225"/>
+            <a:ext cx="0" cy="60146"/>
+          </a:xfrm>
+          <a:prstGeom prst="line">
+            <a:avLst/>
+          </a:prstGeom>
+          <a:ln>
+            <a:solidFill>
+              <a:schemeClr val="tx1"/>
+            </a:solidFill>
+          </a:ln>
+        </p:spPr>
+        <p:style>
+          <a:lnRef idx="1">
+            <a:schemeClr val="accent1"/>
+          </a:lnRef>
+          <a:fillRef idx="0">
+            <a:schemeClr val="accent1"/>
+          </a:fillRef>
+          <a:effectRef idx="0">
+            <a:schemeClr val="accent1"/>
+          </a:effectRef>
+          <a:fontRef idx="minor">
+            <a:schemeClr val="tx1"/>
+          </a:fontRef>
+        </p:style>
+      </p:cxnSp>
+      <p:sp>
+        <p:nvSpPr>
+          <p:cNvPr id="27" name="TextBox 26"/>
+          <p:cNvSpPr txBox="1"/>
+          <p:nvPr/>
+        </p:nvSpPr>
+        <p:spPr>
+          <a:xfrm>
+            <a:off x="6348357" y="6673413"/>
+            <a:ext cx="320922" cy="307777"/>
+          </a:xfrm>
+          <a:prstGeom prst="rect">
+            <a:avLst/>
+          </a:prstGeom>
+          <a:noFill/>
+        </p:spPr>
+        <p:txBody>
+          <a:bodyPr wrap="none" rtlCol="0">
+            <a:spAutoFit/>
+          </a:bodyPr>
+          <a:lstStyle/>
+          <a:p>
+            <a:r>
+              <a:rPr lang="en-US" sz="1400" dirty="0"/>
+              <a:t>3</a:t>
+            </a:r>
+            <a:r>
+              <a:rPr lang="en-US" sz="1400" dirty="0" smtClean="0"/>
+              <a:t>’</a:t>
+            </a:r>
+            <a:endParaRPr lang="en-US" sz="1400" dirty="0"/>
+          </a:p>
+        </p:txBody>
+      </p:sp>
+      <p:cxnSp>
+        <p:nvCxnSpPr>
+          <p:cNvPr id="28" name="Straight Connector 27"/>
+          <p:cNvCxnSpPr/>
+          <p:nvPr/>
+        </p:nvCxnSpPr>
+        <p:spPr>
+          <a:xfrm>
+            <a:off x="6508818" y="6667225"/>
+            <a:ext cx="0" cy="60146"/>
+          </a:xfrm>
+          <a:prstGeom prst="line">
+            <a:avLst/>
+          </a:prstGeom>
+          <a:ln>
+            <a:solidFill>
+              <a:schemeClr val="tx1"/>
+            </a:solidFill>
+          </a:ln>
+        </p:spPr>
+        <p:style>
+          <a:lnRef idx="1">
+            <a:schemeClr val="accent1"/>
+          </a:lnRef>
+          <a:fillRef idx="0">
+            <a:schemeClr val="accent1"/>
+          </a:fillRef>
+          <a:effectRef idx="0">
+            <a:schemeClr val="accent1"/>
+          </a:effectRef>
+          <a:fontRef idx="minor">
+            <a:schemeClr val="tx1"/>
+          </a:fontRef>
+        </p:style>
+      </p:cxnSp>
     </p:spTree>
     <p:extLst>
       <p:ext uri="{BB962C8B-B14F-4D97-AF65-F5344CB8AC3E}">
@@ -4678,7 +5008,7 @@
 </p:sld>
 </file>
 
-<file path=ppt/slides/slide8.xml><?xml version="1.0" encoding="utf-8"?>
+<file path=ppt/slides/slide9.xml><?xml version="1.0" encoding="utf-8"?>
 <p:sld xmlns:a="http://schemas.openxmlformats.org/drawingml/2006/main" xmlns:r="http://schemas.openxmlformats.org/officeDocument/2006/relationships" xmlns:p="http://schemas.openxmlformats.org/presentationml/2006/main">
   <p:cSld>
     <p:spTree>

</xml_diff>

<commit_message>
Ch 3 discussion reworked
</commit_message>
<xml_diff>
--- a/ch3_nascent.figures/ch3_nascent.figures.pptx
+++ b/ch3_nascent.figures/ch3_nascent.figures.pptx
@@ -251,7 +251,7 @@
           <a:p>
             <a:fld id="{8516BED5-9C33-ED42-9E88-68F126CB796E}" type="datetimeFigureOut">
               <a:rPr lang="en-US" smtClean="0"/>
-              <a:t>11/15/15</a:t>
+              <a:t>11/16/15</a:t>
             </a:fld>
             <a:endParaRPr lang="en-US"/>
           </a:p>
@@ -421,7 +421,7 @@
           <a:p>
             <a:fld id="{8516BED5-9C33-ED42-9E88-68F126CB796E}" type="datetimeFigureOut">
               <a:rPr lang="en-US" smtClean="0"/>
-              <a:t>11/15/15</a:t>
+              <a:t>11/16/15</a:t>
             </a:fld>
             <a:endParaRPr lang="en-US"/>
           </a:p>
@@ -601,7 +601,7 @@
           <a:p>
             <a:fld id="{8516BED5-9C33-ED42-9E88-68F126CB796E}" type="datetimeFigureOut">
               <a:rPr lang="en-US" smtClean="0"/>
-              <a:t>11/15/15</a:t>
+              <a:t>11/16/15</a:t>
             </a:fld>
             <a:endParaRPr lang="en-US"/>
           </a:p>
@@ -771,7 +771,7 @@
           <a:p>
             <a:fld id="{8516BED5-9C33-ED42-9E88-68F126CB796E}" type="datetimeFigureOut">
               <a:rPr lang="en-US" smtClean="0"/>
-              <a:t>11/15/15</a:t>
+              <a:t>11/16/15</a:t>
             </a:fld>
             <a:endParaRPr lang="en-US"/>
           </a:p>
@@ -1017,7 +1017,7 @@
           <a:p>
             <a:fld id="{8516BED5-9C33-ED42-9E88-68F126CB796E}" type="datetimeFigureOut">
               <a:rPr lang="en-US" smtClean="0"/>
-              <a:t>11/15/15</a:t>
+              <a:t>11/16/15</a:t>
             </a:fld>
             <a:endParaRPr lang="en-US"/>
           </a:p>
@@ -1249,7 +1249,7 @@
           <a:p>
             <a:fld id="{8516BED5-9C33-ED42-9E88-68F126CB796E}" type="datetimeFigureOut">
               <a:rPr lang="en-US" smtClean="0"/>
-              <a:t>11/15/15</a:t>
+              <a:t>11/16/15</a:t>
             </a:fld>
             <a:endParaRPr lang="en-US"/>
           </a:p>
@@ -1616,7 +1616,7 @@
           <a:p>
             <a:fld id="{8516BED5-9C33-ED42-9E88-68F126CB796E}" type="datetimeFigureOut">
               <a:rPr lang="en-US" smtClean="0"/>
-              <a:t>11/15/15</a:t>
+              <a:t>11/16/15</a:t>
             </a:fld>
             <a:endParaRPr lang="en-US"/>
           </a:p>
@@ -1734,7 +1734,7 @@
           <a:p>
             <a:fld id="{8516BED5-9C33-ED42-9E88-68F126CB796E}" type="datetimeFigureOut">
               <a:rPr lang="en-US" smtClean="0"/>
-              <a:t>11/15/15</a:t>
+              <a:t>11/16/15</a:t>
             </a:fld>
             <a:endParaRPr lang="en-US"/>
           </a:p>
@@ -1829,7 +1829,7 @@
           <a:p>
             <a:fld id="{8516BED5-9C33-ED42-9E88-68F126CB796E}" type="datetimeFigureOut">
               <a:rPr lang="en-US" smtClean="0"/>
-              <a:t>11/15/15</a:t>
+              <a:t>11/16/15</a:t>
             </a:fld>
             <a:endParaRPr lang="en-US"/>
           </a:p>
@@ -2106,7 +2106,7 @@
           <a:p>
             <a:fld id="{8516BED5-9C33-ED42-9E88-68F126CB796E}" type="datetimeFigureOut">
               <a:rPr lang="en-US" smtClean="0"/>
-              <a:t>11/15/15</a:t>
+              <a:t>11/16/15</a:t>
             </a:fld>
             <a:endParaRPr lang="en-US"/>
           </a:p>
@@ -2359,7 +2359,7 @@
           <a:p>
             <a:fld id="{8516BED5-9C33-ED42-9E88-68F126CB796E}" type="datetimeFigureOut">
               <a:rPr lang="en-US" smtClean="0"/>
-              <a:t>11/15/15</a:t>
+              <a:t>11/16/15</a:t>
             </a:fld>
             <a:endParaRPr lang="en-US"/>
           </a:p>
@@ -2572,7 +2572,7 @@
           <a:p>
             <a:fld id="{8516BED5-9C33-ED42-9E88-68F126CB796E}" type="datetimeFigureOut">
               <a:rPr lang="en-US" smtClean="0"/>
-              <a:t>11/15/15</a:t>
+              <a:t>11/16/15</a:t>
             </a:fld>
             <a:endParaRPr lang="en-US"/>
           </a:p>
@@ -3808,7 +3808,6 @@
               <a:rPr lang="en-US" dirty="0"/>
               <a:t>B</a:t>
             </a:r>
-            <a:endParaRPr lang="en-US" dirty="0"/>
           </a:p>
         </p:txBody>
       </p:sp>
@@ -3863,7 +3862,7 @@
         </p:blipFill>
         <p:spPr>
           <a:xfrm>
-            <a:off x="2202249" y="373613"/>
+            <a:off x="1670974" y="373612"/>
             <a:ext cx="4499176" cy="4609485"/>
           </a:xfrm>
           <a:prstGeom prst="rect">
@@ -3892,7 +3891,7 @@
         </p:blipFill>
         <p:spPr>
           <a:xfrm>
-            <a:off x="1493589" y="373612"/>
+            <a:off x="962314" y="373611"/>
             <a:ext cx="708660" cy="4609485"/>
           </a:xfrm>
           <a:prstGeom prst="rect">
@@ -3908,7 +3907,7 @@
           </p:cNvPicPr>
           <p:nvPr/>
         </p:nvPicPr>
-        <p:blipFill>
+        <p:blipFill rotWithShape="1">
           <a:blip r:embed="rId3">
             <a:extLst>
               <a:ext uri="{28A0092B-C50C-407E-A947-70E740481C1C}">
@@ -3916,14 +3915,13 @@
               </a:ext>
             </a:extLst>
           </a:blip>
-          <a:stretch>
-            <a:fillRect/>
-          </a:stretch>
+          <a:srcRect r="21967"/>
+          <a:stretch/>
         </p:blipFill>
         <p:spPr>
           <a:xfrm>
-            <a:off x="8572" y="4983097"/>
-            <a:ext cx="6858000" cy="3967045"/>
+            <a:off x="635432" y="4695488"/>
+            <a:ext cx="5351498" cy="3967045"/>
           </a:xfrm>
           <a:prstGeom prst="rect">
             <a:avLst/>
@@ -3938,7 +3936,7 @@
         </p:nvSpPr>
         <p:spPr>
           <a:xfrm>
-            <a:off x="4825707" y="6363048"/>
+            <a:off x="5452567" y="6075439"/>
             <a:ext cx="274434" cy="307777"/>
           </a:xfrm>
           <a:prstGeom prst="rect">
@@ -3968,7 +3966,7 @@
         </p:nvSpPr>
         <p:spPr>
           <a:xfrm>
-            <a:off x="2556408" y="7250308"/>
+            <a:off x="3183268" y="6962699"/>
             <a:ext cx="274434" cy="307777"/>
           </a:xfrm>
           <a:prstGeom prst="rect">
@@ -3998,7 +3996,7 @@
         </p:nvSpPr>
         <p:spPr>
           <a:xfrm>
-            <a:off x="2969767" y="7004198"/>
+            <a:off x="3596627" y="6716589"/>
             <a:ext cx="274434" cy="307777"/>
           </a:xfrm>
           <a:prstGeom prst="rect">
@@ -4028,7 +4026,7 @@
         </p:nvSpPr>
         <p:spPr>
           <a:xfrm>
-            <a:off x="702556" y="5083305"/>
+            <a:off x="1329416" y="4795696"/>
             <a:ext cx="274434" cy="307777"/>
           </a:xfrm>
           <a:prstGeom prst="rect">
@@ -4058,7 +4056,7 @@
         </p:nvSpPr>
         <p:spPr>
           <a:xfrm>
-            <a:off x="4533551" y="5083305"/>
+            <a:off x="4619921" y="5304206"/>
             <a:ext cx="814647" cy="276999"/>
           </a:xfrm>
           <a:prstGeom prst="rect">
@@ -4122,7 +4120,7 @@
         </p:nvSpPr>
         <p:spPr>
           <a:xfrm>
-            <a:off x="8016" y="4613765"/>
+            <a:off x="325732" y="4369216"/>
             <a:ext cx="309700" cy="369332"/>
           </a:xfrm>
           <a:prstGeom prst="rect">
@@ -4140,10 +4138,38 @@
               <a:rPr lang="en-US" dirty="0"/>
               <a:t>B</a:t>
             </a:r>
-            <a:endParaRPr lang="en-US" dirty="0"/>
-          </a:p>
-        </p:txBody>
-      </p:sp>
+          </a:p>
+        </p:txBody>
+      </p:sp>
+      <p:pic>
+        <p:nvPicPr>
+          <p:cNvPr id="15" name="Picture 14"/>
+          <p:cNvPicPr>
+            <a:picLocks noChangeAspect="1"/>
+          </p:cNvPicPr>
+          <p:nvPr/>
+        </p:nvPicPr>
+        <p:blipFill rotWithShape="1">
+          <a:blip r:embed="rId3">
+            <a:extLst>
+              <a:ext uri="{28A0092B-C50C-407E-A947-70E740481C1C}">
+                <a14:useLocalDpi xmlns:a14="http://schemas.microsoft.com/office/drawing/2010/main" val="0"/>
+              </a:ext>
+            </a:extLst>
+          </a:blip>
+          <a:srcRect l="77981" t="42616" b="44251"/>
+          <a:stretch/>
+        </p:blipFill>
+        <p:spPr>
+          <a:xfrm>
+            <a:off x="4400349" y="4864241"/>
+            <a:ext cx="1510046" cy="520996"/>
+          </a:xfrm>
+          <a:prstGeom prst="rect">
+            <a:avLst/>
+          </a:prstGeom>
+        </p:spPr>
+      </p:pic>
     </p:spTree>
     <p:extLst>
       <p:ext uri="{BB962C8B-B14F-4D97-AF65-F5344CB8AC3E}">

</xml_diff>

<commit_message>
Ch 2 figure integration
</commit_message>
<xml_diff>
--- a/ch3_nascent.figures/ch3_nascent.figures.pptx
+++ b/ch3_nascent.figures/ch3_nascent.figures.pptx
@@ -3920,7 +3920,7 @@
         </p:blipFill>
         <p:spPr>
           <a:xfrm>
-            <a:off x="635432" y="4695488"/>
+            <a:off x="635432" y="5176955"/>
             <a:ext cx="5351498" cy="3967045"/>
           </a:xfrm>
           <a:prstGeom prst="rect">
@@ -3936,7 +3936,7 @@
         </p:nvSpPr>
         <p:spPr>
           <a:xfrm>
-            <a:off x="5452567" y="6075439"/>
+            <a:off x="5452567" y="6556906"/>
             <a:ext cx="274434" cy="307777"/>
           </a:xfrm>
           <a:prstGeom prst="rect">
@@ -3966,7 +3966,7 @@
         </p:nvSpPr>
         <p:spPr>
           <a:xfrm>
-            <a:off x="3183268" y="6962699"/>
+            <a:off x="3183268" y="7444166"/>
             <a:ext cx="274434" cy="307777"/>
           </a:xfrm>
           <a:prstGeom prst="rect">
@@ -3996,7 +3996,7 @@
         </p:nvSpPr>
         <p:spPr>
           <a:xfrm>
-            <a:off x="3596627" y="6716589"/>
+            <a:off x="3596627" y="7198056"/>
             <a:ext cx="274434" cy="307777"/>
           </a:xfrm>
           <a:prstGeom prst="rect">
@@ -4026,7 +4026,7 @@
         </p:nvSpPr>
         <p:spPr>
           <a:xfrm>
-            <a:off x="1329416" y="4795696"/>
+            <a:off x="1329416" y="5277163"/>
             <a:ext cx="274434" cy="307777"/>
           </a:xfrm>
           <a:prstGeom prst="rect">
@@ -4056,7 +4056,7 @@
         </p:nvSpPr>
         <p:spPr>
           <a:xfrm>
-            <a:off x="4619921" y="5304206"/>
+            <a:off x="4619921" y="5785673"/>
             <a:ext cx="814647" cy="276999"/>
           </a:xfrm>
           <a:prstGeom prst="rect">
@@ -4162,7 +4162,7 @@
         </p:blipFill>
         <p:spPr>
           <a:xfrm>
-            <a:off x="4400349" y="4864241"/>
+            <a:off x="4400349" y="5345708"/>
             <a:ext cx="1510046" cy="520996"/>
           </a:xfrm>
           <a:prstGeom prst="rect">
@@ -4346,7 +4346,7 @@
         </p:nvSpPr>
         <p:spPr>
           <a:xfrm>
-            <a:off x="3778695" y="7309360"/>
+            <a:off x="3778695" y="7281067"/>
             <a:ext cx="1215333" cy="461665"/>
           </a:xfrm>
           <a:prstGeom prst="rect">
@@ -4448,7 +4448,7 @@
         </p:nvSpPr>
         <p:spPr>
           <a:xfrm>
-            <a:off x="5360667" y="7348039"/>
+            <a:off x="5360667" y="7369305"/>
             <a:ext cx="1545744" cy="646331"/>
           </a:xfrm>
           <a:prstGeom prst="rect">

</xml_diff>

<commit_message>
Merged ch3_nascent.figures.docx into ch3_nascent.docx
</commit_message>
<xml_diff>
--- a/ch3_nascent.figures/ch3_nascent.figures.pptx
+++ b/ch3_nascent.figures/ch3_nascent.figures.pptx
@@ -2999,8 +2999,8 @@
         </p:blipFill>
         <p:spPr>
           <a:xfrm>
-            <a:off x="2196589" y="576775"/>
-            <a:ext cx="2352397" cy="3377985"/>
+            <a:off x="1752399" y="0"/>
+            <a:ext cx="2872764" cy="4125219"/>
           </a:xfrm>
           <a:prstGeom prst="rect">
             <a:avLst/>
@@ -3028,8 +3028,8 @@
         </p:blipFill>
         <p:spPr>
           <a:xfrm>
-            <a:off x="2588217" y="3840480"/>
-            <a:ext cx="2566644" cy="3110510"/>
+            <a:off x="1893651" y="3954760"/>
+            <a:ext cx="2958272" cy="3585123"/>
           </a:xfrm>
           <a:prstGeom prst="rect">
             <a:avLst/>
@@ -3044,7 +3044,7 @@
         </p:nvSpPr>
         <p:spPr>
           <a:xfrm>
-            <a:off x="2588217" y="6950990"/>
+            <a:off x="1895273" y="7539883"/>
             <a:ext cx="1056700" cy="923330"/>
           </a:xfrm>
           <a:prstGeom prst="rect">
@@ -3095,7 +3095,7 @@
         </p:nvSpPr>
         <p:spPr>
           <a:xfrm>
-            <a:off x="1272998" y="1255362"/>
+            <a:off x="1272998" y="880339"/>
             <a:ext cx="317716" cy="369332"/>
           </a:xfrm>
           <a:prstGeom prst="rect">
@@ -3125,7 +3125,7 @@
         </p:nvSpPr>
         <p:spPr>
           <a:xfrm>
-            <a:off x="1301858" y="4763146"/>
+            <a:off x="1281014" y="5305406"/>
             <a:ext cx="309700" cy="369332"/>
           </a:xfrm>
           <a:prstGeom prst="rect">
@@ -3154,7 +3154,7 @@
         </p:nvSpPr>
         <p:spPr>
           <a:xfrm>
-            <a:off x="2371241" y="1263111"/>
+            <a:off x="2020367" y="880339"/>
             <a:ext cx="224725" cy="294467"/>
           </a:xfrm>
           <a:prstGeom prst="rect">
@@ -3243,9 +3243,9 @@
           </a:stretch>
         </p:blipFill>
         <p:spPr>
-          <a:xfrm>
-            <a:off x="0" y="2578100"/>
-            <a:ext cx="6858000" cy="3967045"/>
+          <a:xfrm rot="16200000">
+            <a:off x="-693937" y="1862898"/>
+            <a:ext cx="8437813" cy="4880896"/>
           </a:xfrm>
           <a:prstGeom prst="rect">
             <a:avLst/>
@@ -3302,9 +3302,9 @@
           <a:stretch/>
         </p:blipFill>
         <p:spPr>
-          <a:xfrm>
-            <a:off x="13934" y="2247254"/>
-            <a:ext cx="6845748" cy="1704814"/>
+          <a:xfrm rot="16200000">
+            <a:off x="-815699" y="3363379"/>
+            <a:ext cx="8855200" cy="2205233"/>
           </a:xfrm>
           <a:prstGeom prst="rect">
             <a:avLst/>
@@ -3714,8 +3714,8 @@
         </p:blipFill>
         <p:spPr>
           <a:xfrm>
-            <a:off x="1706135" y="450388"/>
-            <a:ext cx="3066586" cy="1646044"/>
+            <a:off x="1509823" y="345014"/>
+            <a:ext cx="3262898" cy="1751418"/>
           </a:xfrm>
           <a:prstGeom prst="rect">
             <a:avLst/>

</xml_diff>